<commit_message>
clase 3 y clase 4
</commit_message>
<xml_diff>
--- a/Presentaciones/Indicaciones Generales.pptx
+++ b/Presentaciones/Indicaciones Generales.pptx
@@ -6,16 +6,15 @@
   </p:sldMasterIdLst>
   <p:sldIdLst>
     <p:sldId id="256" r:id="rId2"/>
-    <p:sldId id="257" r:id="rId3"/>
-    <p:sldId id="258" r:id="rId4"/>
-    <p:sldId id="259" r:id="rId5"/>
-    <p:sldId id="260" r:id="rId6"/>
+    <p:sldId id="259" r:id="rId3"/>
+    <p:sldId id="260" r:id="rId4"/>
+    <p:sldId id="257" r:id="rId5"/>
+    <p:sldId id="258" r:id="rId6"/>
     <p:sldId id="262" r:id="rId7"/>
-    <p:sldId id="267" r:id="rId8"/>
-    <p:sldId id="263" r:id="rId9"/>
-    <p:sldId id="264" r:id="rId10"/>
-    <p:sldId id="265" r:id="rId11"/>
-    <p:sldId id="266" r:id="rId12"/>
+    <p:sldId id="263" r:id="rId8"/>
+    <p:sldId id="264" r:id="rId9"/>
+    <p:sldId id="265" r:id="rId10"/>
+    <p:sldId id="266" r:id="rId11"/>
   </p:sldIdLst>
   <p:sldSz cx="12192000" cy="6858000"/>
   <p:notesSz cx="6858000" cy="9144000"/>
@@ -870,753 +869,6 @@
 </file>
 
 <file path=ppt/diagrams/colors2.xml><?xml version="1.0" encoding="utf-8"?>
-<dgm:colorsDef xmlns:dgm="http://schemas.openxmlformats.org/drawingml/2006/diagram" xmlns:a="http://schemas.openxmlformats.org/drawingml/2006/main" uniqueId="urn:microsoft.com/office/officeart/2005/8/colors/accent1_2">
-  <dgm:title val=""/>
-  <dgm:desc val=""/>
-  <dgm:catLst>
-    <dgm:cat type="accent1" pri="11200"/>
-  </dgm:catLst>
-  <dgm:styleLbl name="node0">
-    <dgm:fillClrLst meth="repeat">
-      <a:schemeClr val="accent1"/>
-    </dgm:fillClrLst>
-    <dgm:linClrLst meth="repeat">
-      <a:schemeClr val="lt1"/>
-    </dgm:linClrLst>
-    <dgm:effectClrLst/>
-    <dgm:txLinClrLst/>
-    <dgm:txFillClrLst/>
-    <dgm:txEffectClrLst/>
-  </dgm:styleLbl>
-  <dgm:styleLbl name="alignNode1">
-    <dgm:fillClrLst meth="repeat">
-      <a:schemeClr val="accent1"/>
-    </dgm:fillClrLst>
-    <dgm:linClrLst meth="repeat">
-      <a:schemeClr val="accent1"/>
-    </dgm:linClrLst>
-    <dgm:effectClrLst/>
-    <dgm:txLinClrLst/>
-    <dgm:txFillClrLst/>
-    <dgm:txEffectClrLst/>
-  </dgm:styleLbl>
-  <dgm:styleLbl name="node1">
-    <dgm:fillClrLst meth="repeat">
-      <a:schemeClr val="accent1"/>
-    </dgm:fillClrLst>
-    <dgm:linClrLst meth="repeat">
-      <a:schemeClr val="lt1"/>
-    </dgm:linClrLst>
-    <dgm:effectClrLst/>
-    <dgm:txLinClrLst/>
-    <dgm:txFillClrLst/>
-    <dgm:txEffectClrLst/>
-  </dgm:styleLbl>
-  <dgm:styleLbl name="lnNode1">
-    <dgm:fillClrLst meth="repeat">
-      <a:schemeClr val="accent1"/>
-    </dgm:fillClrLst>
-    <dgm:linClrLst meth="repeat">
-      <a:schemeClr val="lt1"/>
-    </dgm:linClrLst>
-    <dgm:effectClrLst/>
-    <dgm:txLinClrLst/>
-    <dgm:txFillClrLst/>
-    <dgm:txEffectClrLst/>
-  </dgm:styleLbl>
-  <dgm:styleLbl name="vennNode1">
-    <dgm:fillClrLst meth="repeat">
-      <a:schemeClr val="accent1">
-        <a:alpha val="50000"/>
-      </a:schemeClr>
-    </dgm:fillClrLst>
-    <dgm:linClrLst meth="repeat">
-      <a:schemeClr val="lt1"/>
-    </dgm:linClrLst>
-    <dgm:effectClrLst/>
-    <dgm:txLinClrLst/>
-    <dgm:txFillClrLst/>
-    <dgm:txEffectClrLst/>
-  </dgm:styleLbl>
-  <dgm:styleLbl name="node2">
-    <dgm:fillClrLst meth="repeat">
-      <a:schemeClr val="accent1"/>
-    </dgm:fillClrLst>
-    <dgm:linClrLst meth="repeat">
-      <a:schemeClr val="lt1"/>
-    </dgm:linClrLst>
-    <dgm:effectClrLst/>
-    <dgm:txLinClrLst/>
-    <dgm:txFillClrLst/>
-    <dgm:txEffectClrLst/>
-  </dgm:styleLbl>
-  <dgm:styleLbl name="node3">
-    <dgm:fillClrLst meth="repeat">
-      <a:schemeClr val="accent1"/>
-    </dgm:fillClrLst>
-    <dgm:linClrLst meth="repeat">
-      <a:schemeClr val="lt1"/>
-    </dgm:linClrLst>
-    <dgm:effectClrLst/>
-    <dgm:txLinClrLst/>
-    <dgm:txFillClrLst/>
-    <dgm:txEffectClrLst/>
-  </dgm:styleLbl>
-  <dgm:styleLbl name="node4">
-    <dgm:fillClrLst meth="repeat">
-      <a:schemeClr val="accent1"/>
-    </dgm:fillClrLst>
-    <dgm:linClrLst meth="repeat">
-      <a:schemeClr val="lt1"/>
-    </dgm:linClrLst>
-    <dgm:effectClrLst/>
-    <dgm:txLinClrLst/>
-    <dgm:txFillClrLst/>
-    <dgm:txEffectClrLst/>
-  </dgm:styleLbl>
-  <dgm:styleLbl name="fgImgPlace1">
-    <dgm:fillClrLst meth="repeat">
-      <a:schemeClr val="accent1">
-        <a:tint val="50000"/>
-      </a:schemeClr>
-    </dgm:fillClrLst>
-    <dgm:linClrLst meth="repeat">
-      <a:schemeClr val="lt1"/>
-    </dgm:linClrLst>
-    <dgm:effectClrLst/>
-    <dgm:txLinClrLst/>
-    <dgm:txFillClrLst meth="repeat">
-      <a:schemeClr val="lt1"/>
-    </dgm:txFillClrLst>
-    <dgm:txEffectClrLst/>
-  </dgm:styleLbl>
-  <dgm:styleLbl name="alignImgPlace1">
-    <dgm:fillClrLst meth="repeat">
-      <a:schemeClr val="accent1">
-        <a:tint val="50000"/>
-      </a:schemeClr>
-    </dgm:fillClrLst>
-    <dgm:linClrLst meth="repeat">
-      <a:schemeClr val="lt1"/>
-    </dgm:linClrLst>
-    <dgm:effectClrLst/>
-    <dgm:txLinClrLst/>
-    <dgm:txFillClrLst meth="repeat">
-      <a:schemeClr val="lt1"/>
-    </dgm:txFillClrLst>
-    <dgm:txEffectClrLst/>
-  </dgm:styleLbl>
-  <dgm:styleLbl name="bgImgPlace1">
-    <dgm:fillClrLst meth="repeat">
-      <a:schemeClr val="accent1">
-        <a:tint val="50000"/>
-      </a:schemeClr>
-    </dgm:fillClrLst>
-    <dgm:linClrLst meth="repeat">
-      <a:schemeClr val="lt1"/>
-    </dgm:linClrLst>
-    <dgm:effectClrLst/>
-    <dgm:txLinClrLst/>
-    <dgm:txFillClrLst meth="repeat">
-      <a:schemeClr val="lt1"/>
-    </dgm:txFillClrLst>
-    <dgm:txEffectClrLst/>
-  </dgm:styleLbl>
-  <dgm:styleLbl name="sibTrans2D1">
-    <dgm:fillClrLst meth="repeat">
-      <a:schemeClr val="accent1">
-        <a:tint val="60000"/>
-      </a:schemeClr>
-    </dgm:fillClrLst>
-    <dgm:linClrLst meth="repeat">
-      <a:schemeClr val="accent1">
-        <a:tint val="60000"/>
-      </a:schemeClr>
-    </dgm:linClrLst>
-    <dgm:effectClrLst/>
-    <dgm:txLinClrLst/>
-    <dgm:txFillClrLst/>
-    <dgm:txEffectClrLst/>
-  </dgm:styleLbl>
-  <dgm:styleLbl name="fgSibTrans2D1">
-    <dgm:fillClrLst meth="repeat">
-      <a:schemeClr val="accent1">
-        <a:tint val="60000"/>
-      </a:schemeClr>
-    </dgm:fillClrLst>
-    <dgm:linClrLst meth="repeat">
-      <a:schemeClr val="accent1">
-        <a:tint val="60000"/>
-      </a:schemeClr>
-    </dgm:linClrLst>
-    <dgm:effectClrLst/>
-    <dgm:txLinClrLst/>
-    <dgm:txFillClrLst/>
-    <dgm:txEffectClrLst/>
-  </dgm:styleLbl>
-  <dgm:styleLbl name="bgSibTrans2D1">
-    <dgm:fillClrLst meth="repeat">
-      <a:schemeClr val="accent1">
-        <a:tint val="60000"/>
-      </a:schemeClr>
-    </dgm:fillClrLst>
-    <dgm:linClrLst meth="repeat">
-      <a:schemeClr val="accent1">
-        <a:tint val="60000"/>
-      </a:schemeClr>
-    </dgm:linClrLst>
-    <dgm:effectClrLst/>
-    <dgm:txLinClrLst/>
-    <dgm:txFillClrLst/>
-    <dgm:txEffectClrLst/>
-  </dgm:styleLbl>
-  <dgm:styleLbl name="sibTrans1D1">
-    <dgm:fillClrLst meth="repeat">
-      <a:schemeClr val="accent1"/>
-    </dgm:fillClrLst>
-    <dgm:linClrLst meth="repeat">
-      <a:schemeClr val="accent1"/>
-    </dgm:linClrLst>
-    <dgm:effectClrLst/>
-    <dgm:txLinClrLst/>
-    <dgm:txFillClrLst meth="repeat">
-      <a:schemeClr val="tx1"/>
-    </dgm:txFillClrLst>
-    <dgm:txEffectClrLst/>
-  </dgm:styleLbl>
-  <dgm:styleLbl name="callout">
-    <dgm:fillClrLst meth="repeat">
-      <a:schemeClr val="accent1"/>
-    </dgm:fillClrLst>
-    <dgm:linClrLst meth="repeat">
-      <a:schemeClr val="accent1">
-        <a:tint val="50000"/>
-      </a:schemeClr>
-    </dgm:linClrLst>
-    <dgm:effectClrLst/>
-    <dgm:txLinClrLst/>
-    <dgm:txFillClrLst meth="repeat">
-      <a:schemeClr val="tx1"/>
-    </dgm:txFillClrLst>
-    <dgm:txEffectClrLst/>
-  </dgm:styleLbl>
-  <dgm:styleLbl name="asst0">
-    <dgm:fillClrLst meth="repeat">
-      <a:schemeClr val="accent1"/>
-    </dgm:fillClrLst>
-    <dgm:linClrLst meth="repeat">
-      <a:schemeClr val="lt1"/>
-    </dgm:linClrLst>
-    <dgm:effectClrLst/>
-    <dgm:txLinClrLst/>
-    <dgm:txFillClrLst/>
-    <dgm:txEffectClrLst/>
-  </dgm:styleLbl>
-  <dgm:styleLbl name="asst1">
-    <dgm:fillClrLst meth="repeat">
-      <a:schemeClr val="accent1"/>
-    </dgm:fillClrLst>
-    <dgm:linClrLst meth="repeat">
-      <a:schemeClr val="lt1"/>
-    </dgm:linClrLst>
-    <dgm:effectClrLst/>
-    <dgm:txLinClrLst/>
-    <dgm:txFillClrLst/>
-    <dgm:txEffectClrLst/>
-  </dgm:styleLbl>
-  <dgm:styleLbl name="asst2">
-    <dgm:fillClrLst meth="repeat">
-      <a:schemeClr val="accent1"/>
-    </dgm:fillClrLst>
-    <dgm:linClrLst meth="repeat">
-      <a:schemeClr val="lt1"/>
-    </dgm:linClrLst>
-    <dgm:effectClrLst/>
-    <dgm:txLinClrLst/>
-    <dgm:txFillClrLst/>
-    <dgm:txEffectClrLst/>
-  </dgm:styleLbl>
-  <dgm:styleLbl name="asst3">
-    <dgm:fillClrLst meth="repeat">
-      <a:schemeClr val="accent1"/>
-    </dgm:fillClrLst>
-    <dgm:linClrLst meth="repeat">
-      <a:schemeClr val="lt1"/>
-    </dgm:linClrLst>
-    <dgm:effectClrLst/>
-    <dgm:txLinClrLst/>
-    <dgm:txFillClrLst/>
-    <dgm:txEffectClrLst/>
-  </dgm:styleLbl>
-  <dgm:styleLbl name="asst4">
-    <dgm:fillClrLst meth="repeat">
-      <a:schemeClr val="accent1"/>
-    </dgm:fillClrLst>
-    <dgm:linClrLst meth="repeat">
-      <a:schemeClr val="lt1"/>
-    </dgm:linClrLst>
-    <dgm:effectClrLst/>
-    <dgm:txLinClrLst/>
-    <dgm:txFillClrLst/>
-    <dgm:txEffectClrLst/>
-  </dgm:styleLbl>
-  <dgm:styleLbl name="parChTrans2D1">
-    <dgm:fillClrLst meth="repeat">
-      <a:schemeClr val="accent1">
-        <a:tint val="60000"/>
-      </a:schemeClr>
-    </dgm:fillClrLst>
-    <dgm:linClrLst meth="repeat">
-      <a:schemeClr val="accent1">
-        <a:tint val="60000"/>
-      </a:schemeClr>
-    </dgm:linClrLst>
-    <dgm:effectClrLst/>
-    <dgm:txLinClrLst/>
-    <dgm:txFillClrLst meth="repeat">
-      <a:schemeClr val="lt1"/>
-    </dgm:txFillClrLst>
-    <dgm:txEffectClrLst/>
-  </dgm:styleLbl>
-  <dgm:styleLbl name="parChTrans2D2">
-    <dgm:fillClrLst meth="repeat">
-      <a:schemeClr val="accent1"/>
-    </dgm:fillClrLst>
-    <dgm:linClrLst meth="repeat">
-      <a:schemeClr val="accent1"/>
-    </dgm:linClrLst>
-    <dgm:effectClrLst/>
-    <dgm:txLinClrLst/>
-    <dgm:txFillClrLst meth="repeat">
-      <a:schemeClr val="lt1"/>
-    </dgm:txFillClrLst>
-    <dgm:txEffectClrLst/>
-  </dgm:styleLbl>
-  <dgm:styleLbl name="parChTrans2D3">
-    <dgm:fillClrLst meth="repeat">
-      <a:schemeClr val="accent1"/>
-    </dgm:fillClrLst>
-    <dgm:linClrLst meth="repeat">
-      <a:schemeClr val="accent1"/>
-    </dgm:linClrLst>
-    <dgm:effectClrLst/>
-    <dgm:txLinClrLst/>
-    <dgm:txFillClrLst meth="repeat">
-      <a:schemeClr val="lt1"/>
-    </dgm:txFillClrLst>
-    <dgm:txEffectClrLst/>
-  </dgm:styleLbl>
-  <dgm:styleLbl name="parChTrans2D4">
-    <dgm:fillClrLst meth="repeat">
-      <a:schemeClr val="accent1"/>
-    </dgm:fillClrLst>
-    <dgm:linClrLst meth="repeat">
-      <a:schemeClr val="accent1"/>
-    </dgm:linClrLst>
-    <dgm:effectClrLst/>
-    <dgm:txLinClrLst/>
-    <dgm:txFillClrLst meth="repeat">
-      <a:schemeClr val="lt1"/>
-    </dgm:txFillClrLst>
-    <dgm:txEffectClrLst/>
-  </dgm:styleLbl>
-  <dgm:styleLbl name="parChTrans1D1">
-    <dgm:fillClrLst meth="repeat">
-      <a:schemeClr val="accent1"/>
-    </dgm:fillClrLst>
-    <dgm:linClrLst meth="repeat">
-      <a:schemeClr val="accent1">
-        <a:shade val="60000"/>
-      </a:schemeClr>
-    </dgm:linClrLst>
-    <dgm:effectClrLst/>
-    <dgm:txLinClrLst/>
-    <dgm:txFillClrLst meth="repeat">
-      <a:schemeClr val="tx1"/>
-    </dgm:txFillClrLst>
-    <dgm:txEffectClrLst/>
-  </dgm:styleLbl>
-  <dgm:styleLbl name="parChTrans1D2">
-    <dgm:fillClrLst meth="repeat">
-      <a:schemeClr val="accent1"/>
-    </dgm:fillClrLst>
-    <dgm:linClrLst meth="repeat">
-      <a:schemeClr val="accent1">
-        <a:shade val="60000"/>
-      </a:schemeClr>
-    </dgm:linClrLst>
-    <dgm:effectClrLst/>
-    <dgm:txLinClrLst/>
-    <dgm:txFillClrLst meth="repeat">
-      <a:schemeClr val="tx1"/>
-    </dgm:txFillClrLst>
-    <dgm:txEffectClrLst/>
-  </dgm:styleLbl>
-  <dgm:styleLbl name="parChTrans1D3">
-    <dgm:fillClrLst meth="repeat">
-      <a:schemeClr val="accent1"/>
-    </dgm:fillClrLst>
-    <dgm:linClrLst meth="repeat">
-      <a:schemeClr val="accent1">
-        <a:shade val="80000"/>
-      </a:schemeClr>
-    </dgm:linClrLst>
-    <dgm:effectClrLst/>
-    <dgm:txLinClrLst/>
-    <dgm:txFillClrLst meth="repeat">
-      <a:schemeClr val="tx1"/>
-    </dgm:txFillClrLst>
-    <dgm:txEffectClrLst/>
-  </dgm:styleLbl>
-  <dgm:styleLbl name="parChTrans1D4">
-    <dgm:fillClrLst meth="repeat">
-      <a:schemeClr val="accent1"/>
-    </dgm:fillClrLst>
-    <dgm:linClrLst meth="repeat">
-      <a:schemeClr val="accent1">
-        <a:shade val="80000"/>
-      </a:schemeClr>
-    </dgm:linClrLst>
-    <dgm:effectClrLst/>
-    <dgm:txLinClrLst/>
-    <dgm:txFillClrLst meth="repeat">
-      <a:schemeClr val="tx1"/>
-    </dgm:txFillClrLst>
-    <dgm:txEffectClrLst/>
-  </dgm:styleLbl>
-  <dgm:styleLbl name="fgAcc1">
-    <dgm:fillClrLst meth="repeat">
-      <a:schemeClr val="lt1">
-        <a:alpha val="90000"/>
-      </a:schemeClr>
-    </dgm:fillClrLst>
-    <dgm:linClrLst meth="repeat">
-      <a:schemeClr val="accent1"/>
-    </dgm:linClrLst>
-    <dgm:effectClrLst/>
-    <dgm:txLinClrLst/>
-    <dgm:txFillClrLst meth="repeat">
-      <a:schemeClr val="dk1"/>
-    </dgm:txFillClrLst>
-    <dgm:txEffectClrLst/>
-  </dgm:styleLbl>
-  <dgm:styleLbl name="conFgAcc1">
-    <dgm:fillClrLst meth="repeat">
-      <a:schemeClr val="lt1">
-        <a:alpha val="90000"/>
-      </a:schemeClr>
-    </dgm:fillClrLst>
-    <dgm:linClrLst meth="repeat">
-      <a:schemeClr val="accent1"/>
-    </dgm:linClrLst>
-    <dgm:effectClrLst/>
-    <dgm:txLinClrLst/>
-    <dgm:txFillClrLst meth="repeat">
-      <a:schemeClr val="dk1"/>
-    </dgm:txFillClrLst>
-    <dgm:txEffectClrLst/>
-  </dgm:styleLbl>
-  <dgm:styleLbl name="alignAcc1">
-    <dgm:fillClrLst meth="repeat">
-      <a:schemeClr val="lt1">
-        <a:alpha val="90000"/>
-      </a:schemeClr>
-    </dgm:fillClrLst>
-    <dgm:linClrLst meth="repeat">
-      <a:schemeClr val="accent1"/>
-    </dgm:linClrLst>
-    <dgm:effectClrLst/>
-    <dgm:txLinClrLst/>
-    <dgm:txFillClrLst meth="repeat">
-      <a:schemeClr val="dk1"/>
-    </dgm:txFillClrLst>
-    <dgm:txEffectClrLst/>
-  </dgm:styleLbl>
-  <dgm:styleLbl name="trAlignAcc1">
-    <dgm:fillClrLst meth="repeat">
-      <a:schemeClr val="lt1">
-        <a:alpha val="40000"/>
-      </a:schemeClr>
-    </dgm:fillClrLst>
-    <dgm:linClrLst meth="repeat">
-      <a:schemeClr val="accent1"/>
-    </dgm:linClrLst>
-    <dgm:effectClrLst/>
-    <dgm:txLinClrLst/>
-    <dgm:txFillClrLst meth="repeat">
-      <a:schemeClr val="dk1"/>
-    </dgm:txFillClrLst>
-    <dgm:txEffectClrLst/>
-  </dgm:styleLbl>
-  <dgm:styleLbl name="bgAcc1">
-    <dgm:fillClrLst meth="repeat">
-      <a:schemeClr val="lt1">
-        <a:alpha val="90000"/>
-      </a:schemeClr>
-    </dgm:fillClrLst>
-    <dgm:linClrLst meth="repeat">
-      <a:schemeClr val="accent1"/>
-    </dgm:linClrLst>
-    <dgm:effectClrLst/>
-    <dgm:txLinClrLst/>
-    <dgm:txFillClrLst meth="repeat">
-      <a:schemeClr val="dk1"/>
-    </dgm:txFillClrLst>
-    <dgm:txEffectClrLst/>
-  </dgm:styleLbl>
-  <dgm:styleLbl name="solidFgAcc1">
-    <dgm:fillClrLst meth="repeat">
-      <a:schemeClr val="lt1"/>
-    </dgm:fillClrLst>
-    <dgm:linClrLst meth="repeat">
-      <a:schemeClr val="accent1"/>
-    </dgm:linClrLst>
-    <dgm:effectClrLst/>
-    <dgm:txLinClrLst/>
-    <dgm:txFillClrLst meth="repeat">
-      <a:schemeClr val="dk1"/>
-    </dgm:txFillClrLst>
-    <dgm:txEffectClrLst/>
-  </dgm:styleLbl>
-  <dgm:styleLbl name="solidAlignAcc1">
-    <dgm:fillClrLst meth="repeat">
-      <a:schemeClr val="lt1"/>
-    </dgm:fillClrLst>
-    <dgm:linClrLst meth="repeat">
-      <a:schemeClr val="accent1"/>
-    </dgm:linClrLst>
-    <dgm:effectClrLst/>
-    <dgm:txLinClrLst/>
-    <dgm:txFillClrLst meth="repeat">
-      <a:schemeClr val="dk1"/>
-    </dgm:txFillClrLst>
-    <dgm:txEffectClrLst/>
-  </dgm:styleLbl>
-  <dgm:styleLbl name="solidBgAcc1">
-    <dgm:fillClrLst meth="repeat">
-      <a:schemeClr val="lt1"/>
-    </dgm:fillClrLst>
-    <dgm:linClrLst meth="repeat">
-      <a:schemeClr val="accent1"/>
-    </dgm:linClrLst>
-    <dgm:effectClrLst/>
-    <dgm:txLinClrLst/>
-    <dgm:txFillClrLst meth="repeat">
-      <a:schemeClr val="dk1"/>
-    </dgm:txFillClrLst>
-    <dgm:txEffectClrLst/>
-  </dgm:styleLbl>
-  <dgm:styleLbl name="fgAccFollowNode1">
-    <dgm:fillClrLst meth="repeat">
-      <a:schemeClr val="accent1">
-        <a:alpha val="90000"/>
-        <a:tint val="40000"/>
-      </a:schemeClr>
-    </dgm:fillClrLst>
-    <dgm:linClrLst meth="repeat">
-      <a:schemeClr val="accent1">
-        <a:alpha val="90000"/>
-        <a:tint val="40000"/>
-      </a:schemeClr>
-    </dgm:linClrLst>
-    <dgm:effectClrLst/>
-    <dgm:txLinClrLst/>
-    <dgm:txFillClrLst meth="repeat">
-      <a:schemeClr val="dk1"/>
-    </dgm:txFillClrLst>
-    <dgm:txEffectClrLst/>
-  </dgm:styleLbl>
-  <dgm:styleLbl name="alignAccFollowNode1">
-    <dgm:fillClrLst meth="repeat">
-      <a:schemeClr val="accent1">
-        <a:alpha val="90000"/>
-        <a:tint val="40000"/>
-      </a:schemeClr>
-    </dgm:fillClrLst>
-    <dgm:linClrLst meth="repeat">
-      <a:schemeClr val="accent1">
-        <a:alpha val="90000"/>
-        <a:tint val="40000"/>
-      </a:schemeClr>
-    </dgm:linClrLst>
-    <dgm:effectClrLst/>
-    <dgm:txLinClrLst/>
-    <dgm:txFillClrLst meth="repeat">
-      <a:schemeClr val="dk1"/>
-    </dgm:txFillClrLst>
-    <dgm:txEffectClrLst/>
-  </dgm:styleLbl>
-  <dgm:styleLbl name="bgAccFollowNode1">
-    <dgm:fillClrLst meth="repeat">
-      <a:schemeClr val="accent1">
-        <a:alpha val="90000"/>
-        <a:tint val="40000"/>
-      </a:schemeClr>
-    </dgm:fillClrLst>
-    <dgm:linClrLst meth="repeat">
-      <a:schemeClr val="accent1">
-        <a:alpha val="90000"/>
-        <a:tint val="40000"/>
-      </a:schemeClr>
-    </dgm:linClrLst>
-    <dgm:effectClrLst/>
-    <dgm:txLinClrLst/>
-    <dgm:txFillClrLst meth="repeat">
-      <a:schemeClr val="dk1"/>
-    </dgm:txFillClrLst>
-    <dgm:txEffectClrLst/>
-  </dgm:styleLbl>
-  <dgm:styleLbl name="fgAcc0">
-    <dgm:fillClrLst meth="repeat">
-      <a:schemeClr val="lt1">
-        <a:alpha val="90000"/>
-      </a:schemeClr>
-    </dgm:fillClrLst>
-    <dgm:linClrLst meth="repeat">
-      <a:schemeClr val="accent1"/>
-    </dgm:linClrLst>
-    <dgm:effectClrLst/>
-    <dgm:txLinClrLst/>
-    <dgm:txFillClrLst meth="repeat">
-      <a:schemeClr val="dk1"/>
-    </dgm:txFillClrLst>
-    <dgm:txEffectClrLst/>
-  </dgm:styleLbl>
-  <dgm:styleLbl name="fgAcc2">
-    <dgm:fillClrLst meth="repeat">
-      <a:schemeClr val="lt1">
-        <a:alpha val="90000"/>
-      </a:schemeClr>
-    </dgm:fillClrLst>
-    <dgm:linClrLst meth="repeat">
-      <a:schemeClr val="accent1"/>
-    </dgm:linClrLst>
-    <dgm:effectClrLst/>
-    <dgm:txLinClrLst/>
-    <dgm:txFillClrLst meth="repeat">
-      <a:schemeClr val="dk1"/>
-    </dgm:txFillClrLst>
-    <dgm:txEffectClrLst/>
-  </dgm:styleLbl>
-  <dgm:styleLbl name="fgAcc3">
-    <dgm:fillClrLst meth="repeat">
-      <a:schemeClr val="lt1">
-        <a:alpha val="90000"/>
-      </a:schemeClr>
-    </dgm:fillClrLst>
-    <dgm:linClrLst meth="repeat">
-      <a:schemeClr val="accent1"/>
-    </dgm:linClrLst>
-    <dgm:effectClrLst/>
-    <dgm:txLinClrLst/>
-    <dgm:txFillClrLst meth="repeat">
-      <a:schemeClr val="dk1"/>
-    </dgm:txFillClrLst>
-    <dgm:txEffectClrLst/>
-  </dgm:styleLbl>
-  <dgm:styleLbl name="fgAcc4">
-    <dgm:fillClrLst meth="repeat">
-      <a:schemeClr val="lt1">
-        <a:alpha val="90000"/>
-      </a:schemeClr>
-    </dgm:fillClrLst>
-    <dgm:linClrLst meth="repeat">
-      <a:schemeClr val="accent1"/>
-    </dgm:linClrLst>
-    <dgm:effectClrLst/>
-    <dgm:txLinClrLst/>
-    <dgm:txFillClrLst meth="repeat">
-      <a:schemeClr val="dk1"/>
-    </dgm:txFillClrLst>
-    <dgm:txEffectClrLst/>
-  </dgm:styleLbl>
-  <dgm:styleLbl name="bgShp">
-    <dgm:fillClrLst meth="repeat">
-      <a:schemeClr val="accent1">
-        <a:tint val="40000"/>
-      </a:schemeClr>
-    </dgm:fillClrLst>
-    <dgm:linClrLst meth="repeat">
-      <a:schemeClr val="accent1"/>
-    </dgm:linClrLst>
-    <dgm:effectClrLst/>
-    <dgm:txLinClrLst/>
-    <dgm:txFillClrLst meth="repeat">
-      <a:schemeClr val="dk1"/>
-    </dgm:txFillClrLst>
-    <dgm:txEffectClrLst/>
-  </dgm:styleLbl>
-  <dgm:styleLbl name="dkBgShp">
-    <dgm:fillClrLst meth="repeat">
-      <a:schemeClr val="accent1">
-        <a:shade val="80000"/>
-      </a:schemeClr>
-    </dgm:fillClrLst>
-    <dgm:linClrLst meth="repeat">
-      <a:schemeClr val="accent1"/>
-    </dgm:linClrLst>
-    <dgm:effectClrLst/>
-    <dgm:txLinClrLst/>
-    <dgm:txFillClrLst meth="repeat">
-      <a:schemeClr val="lt1"/>
-    </dgm:txFillClrLst>
-    <dgm:txEffectClrLst/>
-  </dgm:styleLbl>
-  <dgm:styleLbl name="trBgShp">
-    <dgm:fillClrLst meth="repeat">
-      <a:schemeClr val="accent1">
-        <a:tint val="50000"/>
-        <a:alpha val="40000"/>
-      </a:schemeClr>
-    </dgm:fillClrLst>
-    <dgm:linClrLst meth="repeat">
-      <a:schemeClr val="accent1"/>
-    </dgm:linClrLst>
-    <dgm:effectClrLst/>
-    <dgm:txLinClrLst/>
-    <dgm:txFillClrLst meth="repeat">
-      <a:schemeClr val="lt1"/>
-    </dgm:txFillClrLst>
-    <dgm:txEffectClrLst/>
-  </dgm:styleLbl>
-  <dgm:styleLbl name="fgShp">
-    <dgm:fillClrLst meth="repeat">
-      <a:schemeClr val="accent1">
-        <a:tint val="60000"/>
-      </a:schemeClr>
-    </dgm:fillClrLst>
-    <dgm:linClrLst meth="repeat">
-      <a:schemeClr val="lt1"/>
-    </dgm:linClrLst>
-    <dgm:effectClrLst/>
-    <dgm:txLinClrLst/>
-    <dgm:txFillClrLst meth="repeat">
-      <a:schemeClr val="dk1"/>
-    </dgm:txFillClrLst>
-    <dgm:txEffectClrLst/>
-  </dgm:styleLbl>
-  <dgm:styleLbl name="revTx">
-    <dgm:fillClrLst meth="repeat">
-      <a:schemeClr val="lt1">
-        <a:alpha val="0"/>
-      </a:schemeClr>
-    </dgm:fillClrLst>
-    <dgm:linClrLst meth="repeat">
-      <a:schemeClr val="dk1">
-        <a:alpha val="0"/>
-      </a:schemeClr>
-    </dgm:linClrLst>
-    <dgm:effectClrLst/>
-    <dgm:txLinClrLst/>
-    <dgm:txFillClrLst meth="repeat">
-      <a:schemeClr val="tx1"/>
-    </dgm:txFillClrLst>
-    <dgm:txEffectClrLst/>
-  </dgm:styleLbl>
-</dgm:colorsDef>
-</file>
-
-<file path=ppt/diagrams/colors3.xml><?xml version="1.0" encoding="utf-8"?>
 <dgm:colorsDef xmlns:dgm="http://schemas.openxmlformats.org/drawingml/2006/diagram" xmlns:a="http://schemas.openxmlformats.org/drawingml/2006/main" uniqueId="urn:microsoft.com/office/officeart/2005/8/colors/accent1_2">
   <dgm:title val=""/>
   <dgm:desc val=""/>
@@ -2876,362 +2128,6 @@
     <dgm:cxn modelId="{91A6C0ED-E34B-4BDD-956C-E32939887B53}" type="presParOf" srcId="{3CB10EAE-1BEB-47AD-8C31-5AF8C547B3E8}" destId="{C39CFC85-55BB-42C9-8D35-4378474799BB}" srcOrd="2" destOrd="0" presId="urn:microsoft.com/office/officeart/2005/8/layout/vList2"/>
     <dgm:cxn modelId="{9A0DE63F-93EF-4D80-9435-708BD00EC8C2}" type="presParOf" srcId="{3CB10EAE-1BEB-47AD-8C31-5AF8C547B3E8}" destId="{E305A6E3-5673-444D-B7FE-1B14EF629170}" srcOrd="3" destOrd="0" presId="urn:microsoft.com/office/officeart/2005/8/layout/vList2"/>
     <dgm:cxn modelId="{0ABA3DCC-0B53-43FD-A65C-4AF6BF14986E}" type="presParOf" srcId="{3CB10EAE-1BEB-47AD-8C31-5AF8C547B3E8}" destId="{FC37CBE2-A766-4409-8B00-55EC3DC473E8}" srcOrd="4" destOrd="0" presId="urn:microsoft.com/office/officeart/2005/8/layout/vList2"/>
-  </dgm:cxnLst>
-  <dgm:bg/>
-  <dgm:whole/>
-  <dgm:extLst>
-    <a:ext uri="http://schemas.microsoft.com/office/drawing/2008/diagram">
-      <dsp:dataModelExt xmlns:dsp="http://schemas.microsoft.com/office/drawing/2008/diagram" relId="rId6" minVer="http://schemas.openxmlformats.org/drawingml/2006/diagram"/>
-    </a:ext>
-  </dgm:extLst>
-</dgm:dataModel>
-</file>
-
-<file path=ppt/diagrams/data3.xml><?xml version="1.0" encoding="utf-8"?>
-<dgm:dataModel xmlns:dgm="http://schemas.openxmlformats.org/drawingml/2006/diagram" xmlns:a="http://schemas.openxmlformats.org/drawingml/2006/main">
-  <dgm:ptLst>
-    <dgm:pt modelId="{8B73131B-CACF-44D5-B6BD-457F78513874}" type="doc">
-      <dgm:prSet loTypeId="urn:microsoft.com/office/officeart/2005/8/layout/vList2" loCatId="list" qsTypeId="urn:microsoft.com/office/officeart/2005/8/quickstyle/simple1" qsCatId="simple" csTypeId="urn:microsoft.com/office/officeart/2005/8/colors/accent1_2" csCatId="accent1" phldr="1"/>
-      <dgm:spPr/>
-      <dgm:t>
-        <a:bodyPr/>
-        <a:lstStyle/>
-        <a:p>
-          <a:endParaRPr lang="en-US"/>
-        </a:p>
-      </dgm:t>
-    </dgm:pt>
-    <dgm:pt modelId="{07D50148-58B4-40B1-A834-E4DBB0290E71}">
-      <dgm:prSet phldrT="[Texto]"/>
-      <dgm:spPr/>
-      <dgm:t>
-        <a:bodyPr/>
-        <a:lstStyle/>
-        <a:p>
-          <a:r>
-            <a:rPr lang="es-EC" dirty="0"/>
-            <a:t>Introducción a Python</a:t>
-          </a:r>
-          <a:endParaRPr lang="en-US" dirty="0"/>
-        </a:p>
-      </dgm:t>
-    </dgm:pt>
-    <dgm:pt modelId="{4309080E-6923-45A3-A48D-B779B215CA5E}" type="parTrans" cxnId="{1DB7933B-D183-4F61-AEA9-262C261D9AC3}">
-      <dgm:prSet/>
-      <dgm:spPr/>
-      <dgm:t>
-        <a:bodyPr/>
-        <a:lstStyle/>
-        <a:p>
-          <a:endParaRPr lang="en-US"/>
-        </a:p>
-      </dgm:t>
-    </dgm:pt>
-    <dgm:pt modelId="{E06472F7-E72A-4B9B-873B-A48D29E840F8}" type="sibTrans" cxnId="{1DB7933B-D183-4F61-AEA9-262C261D9AC3}">
-      <dgm:prSet/>
-      <dgm:spPr/>
-      <dgm:t>
-        <a:bodyPr/>
-        <a:lstStyle/>
-        <a:p>
-          <a:endParaRPr lang="en-US"/>
-        </a:p>
-      </dgm:t>
-    </dgm:pt>
-    <dgm:pt modelId="{5EEB2FDF-46DE-44A3-B656-51435090585A}">
-      <dgm:prSet phldrT="[Texto]"/>
-      <dgm:spPr/>
-      <dgm:t>
-        <a:bodyPr/>
-        <a:lstStyle/>
-        <a:p>
-          <a:r>
-            <a:rPr lang="es-EC" dirty="0"/>
-            <a:t>Variables y operaciones </a:t>
-          </a:r>
-          <a:endParaRPr lang="en-US" dirty="0"/>
-        </a:p>
-      </dgm:t>
-    </dgm:pt>
-    <dgm:pt modelId="{5CE13F57-F165-452B-BA6B-DB0ECF377E6E}" type="parTrans" cxnId="{CF77D467-D1B2-49D7-B64C-485AE947DB3F}">
-      <dgm:prSet/>
-      <dgm:spPr/>
-      <dgm:t>
-        <a:bodyPr/>
-        <a:lstStyle/>
-        <a:p>
-          <a:endParaRPr lang="en-US"/>
-        </a:p>
-      </dgm:t>
-    </dgm:pt>
-    <dgm:pt modelId="{2BAE6908-CE72-402B-8725-A2397EA7F959}" type="sibTrans" cxnId="{CF77D467-D1B2-49D7-B64C-485AE947DB3F}">
-      <dgm:prSet/>
-      <dgm:spPr/>
-      <dgm:t>
-        <a:bodyPr/>
-        <a:lstStyle/>
-        <a:p>
-          <a:endParaRPr lang="en-US"/>
-        </a:p>
-      </dgm:t>
-    </dgm:pt>
-    <dgm:pt modelId="{3BC0520D-E00E-47B7-A9F7-C2BB5684C3F2}">
-      <dgm:prSet phldrT="[Texto]"/>
-      <dgm:spPr/>
-      <dgm:t>
-        <a:bodyPr/>
-        <a:lstStyle/>
-        <a:p>
-          <a:r>
-            <a:rPr lang="es-EC" dirty="0"/>
-            <a:t>Condicionales y ciclos</a:t>
-          </a:r>
-          <a:endParaRPr lang="en-US" dirty="0"/>
-        </a:p>
-      </dgm:t>
-    </dgm:pt>
-    <dgm:pt modelId="{EE16F84D-9354-41DD-9581-4B66D59B7449}" type="parTrans" cxnId="{7F62A8E1-D9CD-4DB9-946A-196A50A74B5B}">
-      <dgm:prSet/>
-      <dgm:spPr/>
-      <dgm:t>
-        <a:bodyPr/>
-        <a:lstStyle/>
-        <a:p>
-          <a:endParaRPr lang="en-US"/>
-        </a:p>
-      </dgm:t>
-    </dgm:pt>
-    <dgm:pt modelId="{735B677B-A075-4B36-8016-DCB6EDDA7FC2}" type="sibTrans" cxnId="{7F62A8E1-D9CD-4DB9-946A-196A50A74B5B}">
-      <dgm:prSet/>
-      <dgm:spPr/>
-      <dgm:t>
-        <a:bodyPr/>
-        <a:lstStyle/>
-        <a:p>
-          <a:endParaRPr lang="en-US"/>
-        </a:p>
-      </dgm:t>
-    </dgm:pt>
-    <dgm:pt modelId="{90528DD9-2845-4C02-A862-09F0BB55293E}">
-      <dgm:prSet phldrT="[Texto]"/>
-      <dgm:spPr/>
-      <dgm:t>
-        <a:bodyPr/>
-        <a:lstStyle/>
-        <a:p>
-          <a:r>
-            <a:rPr lang="es-EC" dirty="0"/>
-            <a:t>Funciones y estructuras de datos</a:t>
-          </a:r>
-          <a:endParaRPr lang="en-US" dirty="0"/>
-        </a:p>
-      </dgm:t>
-    </dgm:pt>
-    <dgm:pt modelId="{573EAA4D-FD17-4AD1-9978-37D8B78B911E}" type="parTrans" cxnId="{887550CA-FD51-40E1-8E4F-A7C2DEB43CAB}">
-      <dgm:prSet/>
-      <dgm:spPr/>
-      <dgm:t>
-        <a:bodyPr/>
-        <a:lstStyle/>
-        <a:p>
-          <a:endParaRPr lang="en-US"/>
-        </a:p>
-      </dgm:t>
-    </dgm:pt>
-    <dgm:pt modelId="{D854D536-8428-461D-A92A-DE6E421C6B05}" type="sibTrans" cxnId="{887550CA-FD51-40E1-8E4F-A7C2DEB43CAB}">
-      <dgm:prSet/>
-      <dgm:spPr/>
-      <dgm:t>
-        <a:bodyPr/>
-        <a:lstStyle/>
-        <a:p>
-          <a:endParaRPr lang="en-US"/>
-        </a:p>
-      </dgm:t>
-    </dgm:pt>
-    <dgm:pt modelId="{02792B85-83BE-4DD2-A3DC-2AB0CB8A3867}">
-      <dgm:prSet phldrT="[Texto]"/>
-      <dgm:spPr/>
-      <dgm:t>
-        <a:bodyPr/>
-        <a:lstStyle/>
-        <a:p>
-          <a:r>
-            <a:rPr lang="es-EC" dirty="0"/>
-            <a:t>Programación Orientada a Objetos</a:t>
-          </a:r>
-          <a:endParaRPr lang="en-US" dirty="0"/>
-        </a:p>
-      </dgm:t>
-    </dgm:pt>
-    <dgm:pt modelId="{1CC5538E-2213-461D-93A6-62007B88B93F}" type="parTrans" cxnId="{EA66979B-3597-4E9A-9B06-D8E095CD40E6}">
-      <dgm:prSet/>
-      <dgm:spPr/>
-      <dgm:t>
-        <a:bodyPr/>
-        <a:lstStyle/>
-        <a:p>
-          <a:endParaRPr lang="en-US"/>
-        </a:p>
-      </dgm:t>
-    </dgm:pt>
-    <dgm:pt modelId="{1F0D44DE-04D9-4D22-8AE8-BB9B4B7DD6D9}" type="sibTrans" cxnId="{EA66979B-3597-4E9A-9B06-D8E095CD40E6}">
-      <dgm:prSet/>
-      <dgm:spPr/>
-      <dgm:t>
-        <a:bodyPr/>
-        <a:lstStyle/>
-        <a:p>
-          <a:endParaRPr lang="en-US"/>
-        </a:p>
-      </dgm:t>
-    </dgm:pt>
-    <dgm:pt modelId="{4C030BBF-9D97-42C3-BBA2-291EDF229BFB}">
-      <dgm:prSet phldrT="[Texto]"/>
-      <dgm:spPr/>
-      <dgm:t>
-        <a:bodyPr/>
-        <a:lstStyle/>
-        <a:p>
-          <a:r>
-            <a:rPr lang="es-EC" dirty="0"/>
-            <a:t>Conexión a Base de Datos</a:t>
-          </a:r>
-          <a:endParaRPr lang="en-US" dirty="0"/>
-        </a:p>
-      </dgm:t>
-    </dgm:pt>
-    <dgm:pt modelId="{7E8E9A4F-4359-42B7-947D-4226D2E9BEFA}" type="parTrans" cxnId="{925774CA-194A-479A-A0D3-537610561CC4}">
-      <dgm:prSet/>
-      <dgm:spPr/>
-      <dgm:t>
-        <a:bodyPr/>
-        <a:lstStyle/>
-        <a:p>
-          <a:endParaRPr lang="en-US"/>
-        </a:p>
-      </dgm:t>
-    </dgm:pt>
-    <dgm:pt modelId="{8682B0DB-A404-4491-BA5E-D02836FA324E}" type="sibTrans" cxnId="{925774CA-194A-479A-A0D3-537610561CC4}">
-      <dgm:prSet/>
-      <dgm:spPr/>
-      <dgm:t>
-        <a:bodyPr/>
-        <a:lstStyle/>
-        <a:p>
-          <a:endParaRPr lang="en-US"/>
-        </a:p>
-      </dgm:t>
-    </dgm:pt>
-    <dgm:pt modelId="{A3083816-8A79-452C-A78A-3FDF5C436968}" type="pres">
-      <dgm:prSet presAssocID="{8B73131B-CACF-44D5-B6BD-457F78513874}" presName="linear" presStyleCnt="0">
-        <dgm:presLayoutVars>
-          <dgm:animLvl val="lvl"/>
-          <dgm:resizeHandles val="exact"/>
-        </dgm:presLayoutVars>
-      </dgm:prSet>
-      <dgm:spPr/>
-    </dgm:pt>
-    <dgm:pt modelId="{87359EEB-4182-4EE9-BF4E-1C0F8C0FFC92}" type="pres">
-      <dgm:prSet presAssocID="{07D50148-58B4-40B1-A834-E4DBB0290E71}" presName="parentText" presStyleLbl="node1" presStyleIdx="0" presStyleCnt="6">
-        <dgm:presLayoutVars>
-          <dgm:chMax val="0"/>
-          <dgm:bulletEnabled val="1"/>
-        </dgm:presLayoutVars>
-      </dgm:prSet>
-      <dgm:spPr/>
-    </dgm:pt>
-    <dgm:pt modelId="{16751EA7-610E-4607-82C1-AAFB1DAF26B8}" type="pres">
-      <dgm:prSet presAssocID="{E06472F7-E72A-4B9B-873B-A48D29E840F8}" presName="spacer" presStyleCnt="0"/>
-      <dgm:spPr/>
-    </dgm:pt>
-    <dgm:pt modelId="{3376051F-A445-4BC8-B403-FDF81F7DAEB8}" type="pres">
-      <dgm:prSet presAssocID="{5EEB2FDF-46DE-44A3-B656-51435090585A}" presName="parentText" presStyleLbl="node1" presStyleIdx="1" presStyleCnt="6">
-        <dgm:presLayoutVars>
-          <dgm:chMax val="0"/>
-          <dgm:bulletEnabled val="1"/>
-        </dgm:presLayoutVars>
-      </dgm:prSet>
-      <dgm:spPr/>
-    </dgm:pt>
-    <dgm:pt modelId="{5867F782-286D-4B40-A1A2-A0436B26764C}" type="pres">
-      <dgm:prSet presAssocID="{2BAE6908-CE72-402B-8725-A2397EA7F959}" presName="spacer" presStyleCnt="0"/>
-      <dgm:spPr/>
-    </dgm:pt>
-    <dgm:pt modelId="{59E5EDE3-D975-4D57-9AD4-ABF94B572069}" type="pres">
-      <dgm:prSet presAssocID="{3BC0520D-E00E-47B7-A9F7-C2BB5684C3F2}" presName="parentText" presStyleLbl="node1" presStyleIdx="2" presStyleCnt="6" custLinFactNeighborX="-300" custLinFactNeighborY="-79687">
-        <dgm:presLayoutVars>
-          <dgm:chMax val="0"/>
-          <dgm:bulletEnabled val="1"/>
-        </dgm:presLayoutVars>
-      </dgm:prSet>
-      <dgm:spPr/>
-    </dgm:pt>
-    <dgm:pt modelId="{1682E99D-59D5-49CE-8CE2-D442D79EEC20}" type="pres">
-      <dgm:prSet presAssocID="{735B677B-A075-4B36-8016-DCB6EDDA7FC2}" presName="spacer" presStyleCnt="0"/>
-      <dgm:spPr/>
-    </dgm:pt>
-    <dgm:pt modelId="{59411D33-5A85-4F85-AD7C-2C442D475FA8}" type="pres">
-      <dgm:prSet presAssocID="{90528DD9-2845-4C02-A862-09F0BB55293E}" presName="parentText" presStyleLbl="node1" presStyleIdx="3" presStyleCnt="6">
-        <dgm:presLayoutVars>
-          <dgm:chMax val="0"/>
-          <dgm:bulletEnabled val="1"/>
-        </dgm:presLayoutVars>
-      </dgm:prSet>
-      <dgm:spPr/>
-    </dgm:pt>
-    <dgm:pt modelId="{73E7C502-FF90-495E-9A59-5334BD4617C5}" type="pres">
-      <dgm:prSet presAssocID="{D854D536-8428-461D-A92A-DE6E421C6B05}" presName="spacer" presStyleCnt="0"/>
-      <dgm:spPr/>
-    </dgm:pt>
-    <dgm:pt modelId="{8353E93A-E2ED-4FCF-A5E7-83518AB961AF}" type="pres">
-      <dgm:prSet presAssocID="{02792B85-83BE-4DD2-A3DC-2AB0CB8A3867}" presName="parentText" presStyleLbl="node1" presStyleIdx="4" presStyleCnt="6">
-        <dgm:presLayoutVars>
-          <dgm:chMax val="0"/>
-          <dgm:bulletEnabled val="1"/>
-        </dgm:presLayoutVars>
-      </dgm:prSet>
-      <dgm:spPr/>
-    </dgm:pt>
-    <dgm:pt modelId="{D4DE75D9-C511-451B-BA70-1C26EF799598}" type="pres">
-      <dgm:prSet presAssocID="{1F0D44DE-04D9-4D22-8AE8-BB9B4B7DD6D9}" presName="spacer" presStyleCnt="0"/>
-      <dgm:spPr/>
-    </dgm:pt>
-    <dgm:pt modelId="{C98BD2F8-A7E9-4C71-9B08-84F4DBDDE1EB}" type="pres">
-      <dgm:prSet presAssocID="{4C030BBF-9D97-42C3-BBA2-291EDF229BFB}" presName="parentText" presStyleLbl="node1" presStyleIdx="5" presStyleCnt="6">
-        <dgm:presLayoutVars>
-          <dgm:chMax val="0"/>
-          <dgm:bulletEnabled val="1"/>
-        </dgm:presLayoutVars>
-      </dgm:prSet>
-      <dgm:spPr/>
-    </dgm:pt>
-  </dgm:ptLst>
-  <dgm:cxnLst>
-    <dgm:cxn modelId="{7D13C511-932E-4508-8FC4-412E741CE2BE}" type="presOf" srcId="{02792B85-83BE-4DD2-A3DC-2AB0CB8A3867}" destId="{8353E93A-E2ED-4FCF-A5E7-83518AB961AF}" srcOrd="0" destOrd="0" presId="urn:microsoft.com/office/officeart/2005/8/layout/vList2"/>
-    <dgm:cxn modelId="{1DB7933B-D183-4F61-AEA9-262C261D9AC3}" srcId="{8B73131B-CACF-44D5-B6BD-457F78513874}" destId="{07D50148-58B4-40B1-A834-E4DBB0290E71}" srcOrd="0" destOrd="0" parTransId="{4309080E-6923-45A3-A48D-B779B215CA5E}" sibTransId="{E06472F7-E72A-4B9B-873B-A48D29E840F8}"/>
-    <dgm:cxn modelId="{B077C261-B003-401D-9C7C-4C7AAC7E1403}" type="presOf" srcId="{5EEB2FDF-46DE-44A3-B656-51435090585A}" destId="{3376051F-A445-4BC8-B403-FDF81F7DAEB8}" srcOrd="0" destOrd="0" presId="urn:microsoft.com/office/officeart/2005/8/layout/vList2"/>
-    <dgm:cxn modelId="{CF77D467-D1B2-49D7-B64C-485AE947DB3F}" srcId="{8B73131B-CACF-44D5-B6BD-457F78513874}" destId="{5EEB2FDF-46DE-44A3-B656-51435090585A}" srcOrd="1" destOrd="0" parTransId="{5CE13F57-F165-452B-BA6B-DB0ECF377E6E}" sibTransId="{2BAE6908-CE72-402B-8725-A2397EA7F959}"/>
-    <dgm:cxn modelId="{C6F4CA71-5D0B-4E38-8A44-0F5FEEB302BE}" type="presOf" srcId="{4C030BBF-9D97-42C3-BBA2-291EDF229BFB}" destId="{C98BD2F8-A7E9-4C71-9B08-84F4DBDDE1EB}" srcOrd="0" destOrd="0" presId="urn:microsoft.com/office/officeart/2005/8/layout/vList2"/>
-    <dgm:cxn modelId="{B9FCD382-2FE2-4EC3-9567-3A4B43290A09}" type="presOf" srcId="{07D50148-58B4-40B1-A834-E4DBB0290E71}" destId="{87359EEB-4182-4EE9-BF4E-1C0F8C0FFC92}" srcOrd="0" destOrd="0" presId="urn:microsoft.com/office/officeart/2005/8/layout/vList2"/>
-    <dgm:cxn modelId="{EA66979B-3597-4E9A-9B06-D8E095CD40E6}" srcId="{8B73131B-CACF-44D5-B6BD-457F78513874}" destId="{02792B85-83BE-4DD2-A3DC-2AB0CB8A3867}" srcOrd="4" destOrd="0" parTransId="{1CC5538E-2213-461D-93A6-62007B88B93F}" sibTransId="{1F0D44DE-04D9-4D22-8AE8-BB9B4B7DD6D9}"/>
-    <dgm:cxn modelId="{887550CA-FD51-40E1-8E4F-A7C2DEB43CAB}" srcId="{8B73131B-CACF-44D5-B6BD-457F78513874}" destId="{90528DD9-2845-4C02-A862-09F0BB55293E}" srcOrd="3" destOrd="0" parTransId="{573EAA4D-FD17-4AD1-9978-37D8B78B911E}" sibTransId="{D854D536-8428-461D-A92A-DE6E421C6B05}"/>
-    <dgm:cxn modelId="{925774CA-194A-479A-A0D3-537610561CC4}" srcId="{8B73131B-CACF-44D5-B6BD-457F78513874}" destId="{4C030BBF-9D97-42C3-BBA2-291EDF229BFB}" srcOrd="5" destOrd="0" parTransId="{7E8E9A4F-4359-42B7-947D-4226D2E9BEFA}" sibTransId="{8682B0DB-A404-4491-BA5E-D02836FA324E}"/>
-    <dgm:cxn modelId="{B70419D3-8648-43AA-AD4C-A35DAD8A13CF}" type="presOf" srcId="{8B73131B-CACF-44D5-B6BD-457F78513874}" destId="{A3083816-8A79-452C-A78A-3FDF5C436968}" srcOrd="0" destOrd="0" presId="urn:microsoft.com/office/officeart/2005/8/layout/vList2"/>
-    <dgm:cxn modelId="{7F62A8E1-D9CD-4DB9-946A-196A50A74B5B}" srcId="{8B73131B-CACF-44D5-B6BD-457F78513874}" destId="{3BC0520D-E00E-47B7-A9F7-C2BB5684C3F2}" srcOrd="2" destOrd="0" parTransId="{EE16F84D-9354-41DD-9581-4B66D59B7449}" sibTransId="{735B677B-A075-4B36-8016-DCB6EDDA7FC2}"/>
-    <dgm:cxn modelId="{02A3BBE8-2B97-43A5-9DB3-4F58D70CF51B}" type="presOf" srcId="{90528DD9-2845-4C02-A862-09F0BB55293E}" destId="{59411D33-5A85-4F85-AD7C-2C442D475FA8}" srcOrd="0" destOrd="0" presId="urn:microsoft.com/office/officeart/2005/8/layout/vList2"/>
-    <dgm:cxn modelId="{0A24A9EA-D91A-4838-BBD2-FCDB3E993A93}" type="presOf" srcId="{3BC0520D-E00E-47B7-A9F7-C2BB5684C3F2}" destId="{59E5EDE3-D975-4D57-9AD4-ABF94B572069}" srcOrd="0" destOrd="0" presId="urn:microsoft.com/office/officeart/2005/8/layout/vList2"/>
-    <dgm:cxn modelId="{32269C3B-AEF4-463B-A51F-9E1D3D2C6928}" type="presParOf" srcId="{A3083816-8A79-452C-A78A-3FDF5C436968}" destId="{87359EEB-4182-4EE9-BF4E-1C0F8C0FFC92}" srcOrd="0" destOrd="0" presId="urn:microsoft.com/office/officeart/2005/8/layout/vList2"/>
-    <dgm:cxn modelId="{245E01AE-A807-4105-B022-A40414D6E742}" type="presParOf" srcId="{A3083816-8A79-452C-A78A-3FDF5C436968}" destId="{16751EA7-610E-4607-82C1-AAFB1DAF26B8}" srcOrd="1" destOrd="0" presId="urn:microsoft.com/office/officeart/2005/8/layout/vList2"/>
-    <dgm:cxn modelId="{40624B4A-86BB-4CF7-B337-8CA7A1F1F187}" type="presParOf" srcId="{A3083816-8A79-452C-A78A-3FDF5C436968}" destId="{3376051F-A445-4BC8-B403-FDF81F7DAEB8}" srcOrd="2" destOrd="0" presId="urn:microsoft.com/office/officeart/2005/8/layout/vList2"/>
-    <dgm:cxn modelId="{F8026D5F-FF06-4673-B608-83FDCD0C3BB9}" type="presParOf" srcId="{A3083816-8A79-452C-A78A-3FDF5C436968}" destId="{5867F782-286D-4B40-A1A2-A0436B26764C}" srcOrd="3" destOrd="0" presId="urn:microsoft.com/office/officeart/2005/8/layout/vList2"/>
-    <dgm:cxn modelId="{8E2F7442-2508-4DF2-978E-835ACF443DE9}" type="presParOf" srcId="{A3083816-8A79-452C-A78A-3FDF5C436968}" destId="{59E5EDE3-D975-4D57-9AD4-ABF94B572069}" srcOrd="4" destOrd="0" presId="urn:microsoft.com/office/officeart/2005/8/layout/vList2"/>
-    <dgm:cxn modelId="{D549EB37-EF03-4BA4-9AC4-E60B5279BDA3}" type="presParOf" srcId="{A3083816-8A79-452C-A78A-3FDF5C436968}" destId="{1682E99D-59D5-49CE-8CE2-D442D79EEC20}" srcOrd="5" destOrd="0" presId="urn:microsoft.com/office/officeart/2005/8/layout/vList2"/>
-    <dgm:cxn modelId="{10E04036-9651-4236-8D24-DD9832C002B3}" type="presParOf" srcId="{A3083816-8A79-452C-A78A-3FDF5C436968}" destId="{59411D33-5A85-4F85-AD7C-2C442D475FA8}" srcOrd="6" destOrd="0" presId="urn:microsoft.com/office/officeart/2005/8/layout/vList2"/>
-    <dgm:cxn modelId="{A7956C1D-AEEA-4A8D-8C16-A412752BB178}" type="presParOf" srcId="{A3083816-8A79-452C-A78A-3FDF5C436968}" destId="{73E7C502-FF90-495E-9A59-5334BD4617C5}" srcOrd="7" destOrd="0" presId="urn:microsoft.com/office/officeart/2005/8/layout/vList2"/>
-    <dgm:cxn modelId="{C0C126EE-7DDA-47A3-B74B-8546E21BF84C}" type="presParOf" srcId="{A3083816-8A79-452C-A78A-3FDF5C436968}" destId="{8353E93A-E2ED-4FCF-A5E7-83518AB961AF}" srcOrd="8" destOrd="0" presId="urn:microsoft.com/office/officeart/2005/8/layout/vList2"/>
-    <dgm:cxn modelId="{BD9D6EBA-4050-4BD1-B96C-ABFA77BDFFA8}" type="presParOf" srcId="{A3083816-8A79-452C-A78A-3FDF5C436968}" destId="{D4DE75D9-C511-451B-BA70-1C26EF799598}" srcOrd="9" destOrd="0" presId="urn:microsoft.com/office/officeart/2005/8/layout/vList2"/>
-    <dgm:cxn modelId="{9F7CD01D-C285-4614-A809-D17AD19D8137}" type="presParOf" srcId="{A3083816-8A79-452C-A78A-3FDF5C436968}" destId="{C98BD2F8-A7E9-4C71-9B08-84F4DBDDE1EB}" srcOrd="10" destOrd="0" presId="urn:microsoft.com/office/officeart/2005/8/layout/vList2"/>
   </dgm:cxnLst>
   <dgm:bg/>
   <dgm:whole/>
@@ -3898,486 +2794,6 @@
 </dsp:drawing>
 </file>
 
-<file path=ppt/diagrams/drawing3.xml><?xml version="1.0" encoding="utf-8"?>
-<dsp:drawing xmlns:dgm="http://schemas.openxmlformats.org/drawingml/2006/diagram" xmlns:dsp="http://schemas.microsoft.com/office/drawing/2008/diagram" xmlns:a="http://schemas.openxmlformats.org/drawingml/2006/main">
-  <dsp:spTree>
-    <dsp:nvGrpSpPr>
-      <dsp:cNvPr id="0" name=""/>
-      <dsp:cNvGrpSpPr/>
-    </dsp:nvGrpSpPr>
-    <dsp:grpSpPr/>
-    <dsp:sp modelId="{87359EEB-4182-4EE9-BF4E-1C0F8C0FFC92}">
-      <dsp:nvSpPr>
-        <dsp:cNvPr id="0" name=""/>
-        <dsp:cNvSpPr/>
-      </dsp:nvSpPr>
-      <dsp:spPr>
-        <a:xfrm>
-          <a:off x="0" y="32487"/>
-          <a:ext cx="10058399" cy="599625"/>
-        </a:xfrm>
-        <a:prstGeom prst="roundRect">
-          <a:avLst/>
-        </a:prstGeom>
-        <a:solidFill>
-          <a:schemeClr val="accent1">
-            <a:hueOff val="0"/>
-            <a:satOff val="0"/>
-            <a:lumOff val="0"/>
-            <a:alphaOff val="0"/>
-          </a:schemeClr>
-        </a:solidFill>
-        <a:ln w="15875" cap="flat" cmpd="sng" algn="ctr">
-          <a:solidFill>
-            <a:schemeClr val="lt1">
-              <a:hueOff val="0"/>
-              <a:satOff val="0"/>
-              <a:lumOff val="0"/>
-              <a:alphaOff val="0"/>
-            </a:schemeClr>
-          </a:solidFill>
-          <a:prstDash val="solid"/>
-        </a:ln>
-        <a:effectLst/>
-      </dsp:spPr>
-      <dsp:style>
-        <a:lnRef idx="2">
-          <a:scrgbClr r="0" g="0" b="0"/>
-        </a:lnRef>
-        <a:fillRef idx="1">
-          <a:scrgbClr r="0" g="0" b="0"/>
-        </a:fillRef>
-        <a:effectRef idx="0">
-          <a:scrgbClr r="0" g="0" b="0"/>
-        </a:effectRef>
-        <a:fontRef idx="minor">
-          <a:schemeClr val="lt1"/>
-        </a:fontRef>
-      </dsp:style>
-      <dsp:txBody>
-        <a:bodyPr spcFirstLastPara="0" vert="horz" wrap="square" lIns="95250" tIns="95250" rIns="95250" bIns="95250" numCol="1" spcCol="1270" anchor="ctr" anchorCtr="0">
-          <a:noAutofit/>
-        </a:bodyPr>
-        <a:lstStyle/>
-        <a:p>
-          <a:pPr marL="0" lvl="0" indent="0" algn="l" defTabSz="1111250">
-            <a:lnSpc>
-              <a:spcPct val="90000"/>
-            </a:lnSpc>
-            <a:spcBef>
-              <a:spcPct val="0"/>
-            </a:spcBef>
-            <a:spcAft>
-              <a:spcPct val="35000"/>
-            </a:spcAft>
-            <a:buNone/>
-          </a:pPr>
-          <a:r>
-            <a:rPr lang="es-EC" sz="2500" kern="1200" dirty="0"/>
-            <a:t>Introducción a Python</a:t>
-          </a:r>
-          <a:endParaRPr lang="en-US" sz="2500" kern="1200" dirty="0"/>
-        </a:p>
-      </dsp:txBody>
-      <dsp:txXfrm>
-        <a:off x="29271" y="61758"/>
-        <a:ext cx="9999857" cy="541083"/>
-      </dsp:txXfrm>
-    </dsp:sp>
-    <dsp:sp modelId="{3376051F-A445-4BC8-B403-FDF81F7DAEB8}">
-      <dsp:nvSpPr>
-        <dsp:cNvPr id="0" name=""/>
-        <dsp:cNvSpPr/>
-      </dsp:nvSpPr>
-      <dsp:spPr>
-        <a:xfrm>
-          <a:off x="0" y="704112"/>
-          <a:ext cx="10058399" cy="599625"/>
-        </a:xfrm>
-        <a:prstGeom prst="roundRect">
-          <a:avLst/>
-        </a:prstGeom>
-        <a:solidFill>
-          <a:schemeClr val="accent1">
-            <a:hueOff val="0"/>
-            <a:satOff val="0"/>
-            <a:lumOff val="0"/>
-            <a:alphaOff val="0"/>
-          </a:schemeClr>
-        </a:solidFill>
-        <a:ln w="15875" cap="flat" cmpd="sng" algn="ctr">
-          <a:solidFill>
-            <a:schemeClr val="lt1">
-              <a:hueOff val="0"/>
-              <a:satOff val="0"/>
-              <a:lumOff val="0"/>
-              <a:alphaOff val="0"/>
-            </a:schemeClr>
-          </a:solidFill>
-          <a:prstDash val="solid"/>
-        </a:ln>
-        <a:effectLst/>
-      </dsp:spPr>
-      <dsp:style>
-        <a:lnRef idx="2">
-          <a:scrgbClr r="0" g="0" b="0"/>
-        </a:lnRef>
-        <a:fillRef idx="1">
-          <a:scrgbClr r="0" g="0" b="0"/>
-        </a:fillRef>
-        <a:effectRef idx="0">
-          <a:scrgbClr r="0" g="0" b="0"/>
-        </a:effectRef>
-        <a:fontRef idx="minor">
-          <a:schemeClr val="lt1"/>
-        </a:fontRef>
-      </dsp:style>
-      <dsp:txBody>
-        <a:bodyPr spcFirstLastPara="0" vert="horz" wrap="square" lIns="95250" tIns="95250" rIns="95250" bIns="95250" numCol="1" spcCol="1270" anchor="ctr" anchorCtr="0">
-          <a:noAutofit/>
-        </a:bodyPr>
-        <a:lstStyle/>
-        <a:p>
-          <a:pPr marL="0" lvl="0" indent="0" algn="l" defTabSz="1111250">
-            <a:lnSpc>
-              <a:spcPct val="90000"/>
-            </a:lnSpc>
-            <a:spcBef>
-              <a:spcPct val="0"/>
-            </a:spcBef>
-            <a:spcAft>
-              <a:spcPct val="35000"/>
-            </a:spcAft>
-            <a:buNone/>
-          </a:pPr>
-          <a:r>
-            <a:rPr lang="es-EC" sz="2500" kern="1200" dirty="0"/>
-            <a:t>Variables y operaciones </a:t>
-          </a:r>
-          <a:endParaRPr lang="en-US" sz="2500" kern="1200" dirty="0"/>
-        </a:p>
-      </dsp:txBody>
-      <dsp:txXfrm>
-        <a:off x="29271" y="733383"/>
-        <a:ext cx="9999857" cy="541083"/>
-      </dsp:txXfrm>
-    </dsp:sp>
-    <dsp:sp modelId="{59E5EDE3-D975-4D57-9AD4-ABF94B572069}">
-      <dsp:nvSpPr>
-        <dsp:cNvPr id="0" name=""/>
-        <dsp:cNvSpPr/>
-      </dsp:nvSpPr>
-      <dsp:spPr>
-        <a:xfrm>
-          <a:off x="0" y="1318362"/>
-          <a:ext cx="10058399" cy="599625"/>
-        </a:xfrm>
-        <a:prstGeom prst="roundRect">
-          <a:avLst/>
-        </a:prstGeom>
-        <a:solidFill>
-          <a:schemeClr val="accent1">
-            <a:hueOff val="0"/>
-            <a:satOff val="0"/>
-            <a:lumOff val="0"/>
-            <a:alphaOff val="0"/>
-          </a:schemeClr>
-        </a:solidFill>
-        <a:ln w="15875" cap="flat" cmpd="sng" algn="ctr">
-          <a:solidFill>
-            <a:schemeClr val="lt1">
-              <a:hueOff val="0"/>
-              <a:satOff val="0"/>
-              <a:lumOff val="0"/>
-              <a:alphaOff val="0"/>
-            </a:schemeClr>
-          </a:solidFill>
-          <a:prstDash val="solid"/>
-        </a:ln>
-        <a:effectLst/>
-      </dsp:spPr>
-      <dsp:style>
-        <a:lnRef idx="2">
-          <a:scrgbClr r="0" g="0" b="0"/>
-        </a:lnRef>
-        <a:fillRef idx="1">
-          <a:scrgbClr r="0" g="0" b="0"/>
-        </a:fillRef>
-        <a:effectRef idx="0">
-          <a:scrgbClr r="0" g="0" b="0"/>
-        </a:effectRef>
-        <a:fontRef idx="minor">
-          <a:schemeClr val="lt1"/>
-        </a:fontRef>
-      </dsp:style>
-      <dsp:txBody>
-        <a:bodyPr spcFirstLastPara="0" vert="horz" wrap="square" lIns="95250" tIns="95250" rIns="95250" bIns="95250" numCol="1" spcCol="1270" anchor="ctr" anchorCtr="0">
-          <a:noAutofit/>
-        </a:bodyPr>
-        <a:lstStyle/>
-        <a:p>
-          <a:pPr marL="0" lvl="0" indent="0" algn="l" defTabSz="1111250">
-            <a:lnSpc>
-              <a:spcPct val="90000"/>
-            </a:lnSpc>
-            <a:spcBef>
-              <a:spcPct val="0"/>
-            </a:spcBef>
-            <a:spcAft>
-              <a:spcPct val="35000"/>
-            </a:spcAft>
-            <a:buNone/>
-          </a:pPr>
-          <a:r>
-            <a:rPr lang="es-EC" sz="2500" kern="1200" dirty="0"/>
-            <a:t>Condicionales y ciclos</a:t>
-          </a:r>
-          <a:endParaRPr lang="en-US" sz="2500" kern="1200" dirty="0"/>
-        </a:p>
-      </dsp:txBody>
-      <dsp:txXfrm>
-        <a:off x="29271" y="1347633"/>
-        <a:ext cx="9999857" cy="541083"/>
-      </dsp:txXfrm>
-    </dsp:sp>
-    <dsp:sp modelId="{59411D33-5A85-4F85-AD7C-2C442D475FA8}">
-      <dsp:nvSpPr>
-        <dsp:cNvPr id="0" name=""/>
-        <dsp:cNvSpPr/>
-      </dsp:nvSpPr>
-      <dsp:spPr>
-        <a:xfrm>
-          <a:off x="0" y="2047362"/>
-          <a:ext cx="10058399" cy="599625"/>
-        </a:xfrm>
-        <a:prstGeom prst="roundRect">
-          <a:avLst/>
-        </a:prstGeom>
-        <a:solidFill>
-          <a:schemeClr val="accent1">
-            <a:hueOff val="0"/>
-            <a:satOff val="0"/>
-            <a:lumOff val="0"/>
-            <a:alphaOff val="0"/>
-          </a:schemeClr>
-        </a:solidFill>
-        <a:ln w="15875" cap="flat" cmpd="sng" algn="ctr">
-          <a:solidFill>
-            <a:schemeClr val="lt1">
-              <a:hueOff val="0"/>
-              <a:satOff val="0"/>
-              <a:lumOff val="0"/>
-              <a:alphaOff val="0"/>
-            </a:schemeClr>
-          </a:solidFill>
-          <a:prstDash val="solid"/>
-        </a:ln>
-        <a:effectLst/>
-      </dsp:spPr>
-      <dsp:style>
-        <a:lnRef idx="2">
-          <a:scrgbClr r="0" g="0" b="0"/>
-        </a:lnRef>
-        <a:fillRef idx="1">
-          <a:scrgbClr r="0" g="0" b="0"/>
-        </a:fillRef>
-        <a:effectRef idx="0">
-          <a:scrgbClr r="0" g="0" b="0"/>
-        </a:effectRef>
-        <a:fontRef idx="minor">
-          <a:schemeClr val="lt1"/>
-        </a:fontRef>
-      </dsp:style>
-      <dsp:txBody>
-        <a:bodyPr spcFirstLastPara="0" vert="horz" wrap="square" lIns="95250" tIns="95250" rIns="95250" bIns="95250" numCol="1" spcCol="1270" anchor="ctr" anchorCtr="0">
-          <a:noAutofit/>
-        </a:bodyPr>
-        <a:lstStyle/>
-        <a:p>
-          <a:pPr marL="0" lvl="0" indent="0" algn="l" defTabSz="1111250">
-            <a:lnSpc>
-              <a:spcPct val="90000"/>
-            </a:lnSpc>
-            <a:spcBef>
-              <a:spcPct val="0"/>
-            </a:spcBef>
-            <a:spcAft>
-              <a:spcPct val="35000"/>
-            </a:spcAft>
-            <a:buNone/>
-          </a:pPr>
-          <a:r>
-            <a:rPr lang="es-EC" sz="2500" kern="1200" dirty="0"/>
-            <a:t>Funciones y estructuras de datos</a:t>
-          </a:r>
-          <a:endParaRPr lang="en-US" sz="2500" kern="1200" dirty="0"/>
-        </a:p>
-      </dsp:txBody>
-      <dsp:txXfrm>
-        <a:off x="29271" y="2076633"/>
-        <a:ext cx="9999857" cy="541083"/>
-      </dsp:txXfrm>
-    </dsp:sp>
-    <dsp:sp modelId="{8353E93A-E2ED-4FCF-A5E7-83518AB961AF}">
-      <dsp:nvSpPr>
-        <dsp:cNvPr id="0" name=""/>
-        <dsp:cNvSpPr/>
-      </dsp:nvSpPr>
-      <dsp:spPr>
-        <a:xfrm>
-          <a:off x="0" y="2718987"/>
-          <a:ext cx="10058399" cy="599625"/>
-        </a:xfrm>
-        <a:prstGeom prst="roundRect">
-          <a:avLst/>
-        </a:prstGeom>
-        <a:solidFill>
-          <a:schemeClr val="accent1">
-            <a:hueOff val="0"/>
-            <a:satOff val="0"/>
-            <a:lumOff val="0"/>
-            <a:alphaOff val="0"/>
-          </a:schemeClr>
-        </a:solidFill>
-        <a:ln w="15875" cap="flat" cmpd="sng" algn="ctr">
-          <a:solidFill>
-            <a:schemeClr val="lt1">
-              <a:hueOff val="0"/>
-              <a:satOff val="0"/>
-              <a:lumOff val="0"/>
-              <a:alphaOff val="0"/>
-            </a:schemeClr>
-          </a:solidFill>
-          <a:prstDash val="solid"/>
-        </a:ln>
-        <a:effectLst/>
-      </dsp:spPr>
-      <dsp:style>
-        <a:lnRef idx="2">
-          <a:scrgbClr r="0" g="0" b="0"/>
-        </a:lnRef>
-        <a:fillRef idx="1">
-          <a:scrgbClr r="0" g="0" b="0"/>
-        </a:fillRef>
-        <a:effectRef idx="0">
-          <a:scrgbClr r="0" g="0" b="0"/>
-        </a:effectRef>
-        <a:fontRef idx="minor">
-          <a:schemeClr val="lt1"/>
-        </a:fontRef>
-      </dsp:style>
-      <dsp:txBody>
-        <a:bodyPr spcFirstLastPara="0" vert="horz" wrap="square" lIns="95250" tIns="95250" rIns="95250" bIns="95250" numCol="1" spcCol="1270" anchor="ctr" anchorCtr="0">
-          <a:noAutofit/>
-        </a:bodyPr>
-        <a:lstStyle/>
-        <a:p>
-          <a:pPr marL="0" lvl="0" indent="0" algn="l" defTabSz="1111250">
-            <a:lnSpc>
-              <a:spcPct val="90000"/>
-            </a:lnSpc>
-            <a:spcBef>
-              <a:spcPct val="0"/>
-            </a:spcBef>
-            <a:spcAft>
-              <a:spcPct val="35000"/>
-            </a:spcAft>
-            <a:buNone/>
-          </a:pPr>
-          <a:r>
-            <a:rPr lang="es-EC" sz="2500" kern="1200" dirty="0"/>
-            <a:t>Programación Orientada a Objetos</a:t>
-          </a:r>
-          <a:endParaRPr lang="en-US" sz="2500" kern="1200" dirty="0"/>
-        </a:p>
-      </dsp:txBody>
-      <dsp:txXfrm>
-        <a:off x="29271" y="2748258"/>
-        <a:ext cx="9999857" cy="541083"/>
-      </dsp:txXfrm>
-    </dsp:sp>
-    <dsp:sp modelId="{C98BD2F8-A7E9-4C71-9B08-84F4DBDDE1EB}">
-      <dsp:nvSpPr>
-        <dsp:cNvPr id="0" name=""/>
-        <dsp:cNvSpPr/>
-      </dsp:nvSpPr>
-      <dsp:spPr>
-        <a:xfrm>
-          <a:off x="0" y="3390612"/>
-          <a:ext cx="10058399" cy="599625"/>
-        </a:xfrm>
-        <a:prstGeom prst="roundRect">
-          <a:avLst/>
-        </a:prstGeom>
-        <a:solidFill>
-          <a:schemeClr val="accent1">
-            <a:hueOff val="0"/>
-            <a:satOff val="0"/>
-            <a:lumOff val="0"/>
-            <a:alphaOff val="0"/>
-          </a:schemeClr>
-        </a:solidFill>
-        <a:ln w="15875" cap="flat" cmpd="sng" algn="ctr">
-          <a:solidFill>
-            <a:schemeClr val="lt1">
-              <a:hueOff val="0"/>
-              <a:satOff val="0"/>
-              <a:lumOff val="0"/>
-              <a:alphaOff val="0"/>
-            </a:schemeClr>
-          </a:solidFill>
-          <a:prstDash val="solid"/>
-        </a:ln>
-        <a:effectLst/>
-      </dsp:spPr>
-      <dsp:style>
-        <a:lnRef idx="2">
-          <a:scrgbClr r="0" g="0" b="0"/>
-        </a:lnRef>
-        <a:fillRef idx="1">
-          <a:scrgbClr r="0" g="0" b="0"/>
-        </a:fillRef>
-        <a:effectRef idx="0">
-          <a:scrgbClr r="0" g="0" b="0"/>
-        </a:effectRef>
-        <a:fontRef idx="minor">
-          <a:schemeClr val="lt1"/>
-        </a:fontRef>
-      </dsp:style>
-      <dsp:txBody>
-        <a:bodyPr spcFirstLastPara="0" vert="horz" wrap="square" lIns="95250" tIns="95250" rIns="95250" bIns="95250" numCol="1" spcCol="1270" anchor="ctr" anchorCtr="0">
-          <a:noAutofit/>
-        </a:bodyPr>
-        <a:lstStyle/>
-        <a:p>
-          <a:pPr marL="0" lvl="0" indent="0" algn="l" defTabSz="1111250">
-            <a:lnSpc>
-              <a:spcPct val="90000"/>
-            </a:lnSpc>
-            <a:spcBef>
-              <a:spcPct val="0"/>
-            </a:spcBef>
-            <a:spcAft>
-              <a:spcPct val="35000"/>
-            </a:spcAft>
-            <a:buNone/>
-          </a:pPr>
-          <a:r>
-            <a:rPr lang="es-EC" sz="2500" kern="1200" dirty="0"/>
-            <a:t>Conexión a Base de Datos</a:t>
-          </a:r>
-          <a:endParaRPr lang="en-US" sz="2500" kern="1200" dirty="0"/>
-        </a:p>
-      </dsp:txBody>
-      <dsp:txXfrm>
-        <a:off x="29271" y="3419883"/>
-        <a:ext cx="9999857" cy="541083"/>
-      </dsp:txXfrm>
-    </dsp:sp>
-  </dsp:spTree>
-</dsp:drawing>
-</file>
-
 <file path=ppt/diagrams/layout1.xml><?xml version="1.0" encoding="utf-8"?>
 <dgm:layoutDef xmlns:dgm="http://schemas.openxmlformats.org/drawingml/2006/diagram" xmlns:a="http://schemas.openxmlformats.org/drawingml/2006/main" uniqueId="urn:microsoft.com/office/officeart/2005/8/layout/vList2">
   <dgm:title val=""/>
@@ -4712,173 +3128,6 @@
 </dgm:layoutDef>
 </file>
 
-<file path=ppt/diagrams/layout3.xml><?xml version="1.0" encoding="utf-8"?>
-<dgm:layoutDef xmlns:dgm="http://schemas.openxmlformats.org/drawingml/2006/diagram" xmlns:a="http://schemas.openxmlformats.org/drawingml/2006/main" uniqueId="urn:microsoft.com/office/officeart/2005/8/layout/vList2">
-  <dgm:title val=""/>
-  <dgm:desc val=""/>
-  <dgm:catLst>
-    <dgm:cat type="list" pri="3000"/>
-    <dgm:cat type="convert" pri="1000"/>
-  </dgm:catLst>
-  <dgm:sampData>
-    <dgm:dataModel>
-      <dgm:ptLst>
-        <dgm:pt modelId="0" type="doc"/>
-        <dgm:pt modelId="1">
-          <dgm:prSet phldr="1"/>
-        </dgm:pt>
-        <dgm:pt modelId="11">
-          <dgm:prSet phldr="1"/>
-        </dgm:pt>
-        <dgm:pt modelId="2">
-          <dgm:prSet phldr="1"/>
-        </dgm:pt>
-        <dgm:pt modelId="21">
-          <dgm:prSet phldr="1"/>
-        </dgm:pt>
-      </dgm:ptLst>
-      <dgm:cxnLst>
-        <dgm:cxn modelId="4" srcId="0" destId="1" srcOrd="0" destOrd="0"/>
-        <dgm:cxn modelId="5" srcId="0" destId="2" srcOrd="1" destOrd="0"/>
-        <dgm:cxn modelId="12" srcId="1" destId="11" srcOrd="0" destOrd="0"/>
-        <dgm:cxn modelId="23" srcId="2" destId="21" srcOrd="0" destOrd="0"/>
-      </dgm:cxnLst>
-      <dgm:bg/>
-      <dgm:whole/>
-    </dgm:dataModel>
-  </dgm:sampData>
-  <dgm:styleData>
-    <dgm:dataModel>
-      <dgm:ptLst>
-        <dgm:pt modelId="0" type="doc"/>
-        <dgm:pt modelId="1"/>
-        <dgm:pt modelId="2"/>
-      </dgm:ptLst>
-      <dgm:cxnLst>
-        <dgm:cxn modelId="3" srcId="0" destId="1" srcOrd="0" destOrd="0"/>
-        <dgm:cxn modelId="4" srcId="0" destId="2" srcOrd="1" destOrd="0"/>
-      </dgm:cxnLst>
-      <dgm:bg/>
-      <dgm:whole/>
-    </dgm:dataModel>
-  </dgm:styleData>
-  <dgm:clrData>
-    <dgm:dataModel>
-      <dgm:ptLst>
-        <dgm:pt modelId="0" type="doc"/>
-        <dgm:pt modelId="1"/>
-        <dgm:pt modelId="2"/>
-        <dgm:pt modelId="3"/>
-        <dgm:pt modelId="4"/>
-      </dgm:ptLst>
-      <dgm:cxnLst>
-        <dgm:cxn modelId="5" srcId="0" destId="1" srcOrd="0" destOrd="0"/>
-        <dgm:cxn modelId="6" srcId="0" destId="2" srcOrd="1" destOrd="0"/>
-        <dgm:cxn modelId="7" srcId="0" destId="3" srcOrd="2" destOrd="0"/>
-        <dgm:cxn modelId="8" srcId="0" destId="4" srcOrd="3" destOrd="0"/>
-      </dgm:cxnLst>
-      <dgm:bg/>
-      <dgm:whole/>
-    </dgm:dataModel>
-  </dgm:clrData>
-  <dgm:layoutNode name="linear">
-    <dgm:varLst>
-      <dgm:animLvl val="lvl"/>
-      <dgm:resizeHandles val="exact"/>
-    </dgm:varLst>
-    <dgm:alg type="lin">
-      <dgm:param type="linDir" val="fromT"/>
-      <dgm:param type="vertAlign" val="mid"/>
-    </dgm:alg>
-    <dgm:shape xmlns:r="http://schemas.openxmlformats.org/officeDocument/2006/relationships" r:blip="">
-      <dgm:adjLst/>
-    </dgm:shape>
-    <dgm:presOf/>
-    <dgm:constrLst>
-      <dgm:constr type="w" for="ch" forName="parentText" refType="w"/>
-      <dgm:constr type="h" for="ch" forName="parentText" refType="primFontSz" refFor="ch" refForName="parentText" fact="0.52"/>
-      <dgm:constr type="w" for="ch" forName="childText" refType="w"/>
-      <dgm:constr type="h" for="ch" forName="childText" refType="primFontSz" refFor="ch" refForName="parentText" fact="0.46"/>
-      <dgm:constr type="h" for="ch" forName="parentText" op="equ"/>
-      <dgm:constr type="primFontSz" for="ch" forName="parentText" op="equ" val="65"/>
-      <dgm:constr type="primFontSz" for="ch" forName="childText" refType="primFontSz" refFor="ch" refForName="parentText" op="equ"/>
-      <dgm:constr type="h" for="ch" forName="spacer" refType="primFontSz" refFor="ch" refForName="parentText" fact="0.08"/>
-    </dgm:constrLst>
-    <dgm:ruleLst>
-      <dgm:rule type="primFontSz" for="ch" forName="parentText" val="5" fact="NaN" max="NaN"/>
-    </dgm:ruleLst>
-    <dgm:forEach name="Name0" axis="ch" ptType="node">
-      <dgm:layoutNode name="parentText" styleLbl="node1">
-        <dgm:varLst>
-          <dgm:chMax val="0"/>
-          <dgm:bulletEnabled val="1"/>
-        </dgm:varLst>
-        <dgm:alg type="tx">
-          <dgm:param type="parTxLTRAlign" val="l"/>
-          <dgm:param type="parTxRTLAlign" val="r"/>
-        </dgm:alg>
-        <dgm:shape xmlns:r="http://schemas.openxmlformats.org/officeDocument/2006/relationships" type="roundRect" r:blip="">
-          <dgm:adjLst/>
-        </dgm:shape>
-        <dgm:presOf axis="self"/>
-        <dgm:constrLst>
-          <dgm:constr type="tMarg" refType="primFontSz" fact="0.3"/>
-          <dgm:constr type="bMarg" refType="primFontSz" fact="0.3"/>
-          <dgm:constr type="lMarg" refType="primFontSz" fact="0.3"/>
-          <dgm:constr type="rMarg" refType="primFontSz" fact="0.3"/>
-        </dgm:constrLst>
-        <dgm:ruleLst>
-          <dgm:rule type="h" val="INF" fact="NaN" max="NaN"/>
-        </dgm:ruleLst>
-      </dgm:layoutNode>
-      <dgm:choose name="Name1">
-        <dgm:if name="Name2" axis="ch" ptType="node" func="cnt" op="gte" val="1">
-          <dgm:layoutNode name="childText" styleLbl="revTx">
-            <dgm:varLst>
-              <dgm:bulletEnabled val="1"/>
-            </dgm:varLst>
-            <dgm:alg type="tx">
-              <dgm:param type="stBulletLvl" val="1"/>
-              <dgm:param type="lnSpAfChP" val="20"/>
-            </dgm:alg>
-            <dgm:shape xmlns:r="http://schemas.openxmlformats.org/officeDocument/2006/relationships" type="rect" r:blip="">
-              <dgm:adjLst/>
-            </dgm:shape>
-            <dgm:presOf axis="des" ptType="node"/>
-            <dgm:constrLst>
-              <dgm:constr type="tMarg" refType="primFontSz" fact="0.1"/>
-              <dgm:constr type="bMarg" refType="primFontSz" fact="0.1"/>
-              <dgm:constr type="lMarg" refType="w" fact="0.09"/>
-            </dgm:constrLst>
-            <dgm:ruleLst>
-              <dgm:rule type="h" val="INF" fact="NaN" max="NaN"/>
-            </dgm:ruleLst>
-          </dgm:layoutNode>
-        </dgm:if>
-        <dgm:else name="Name3">
-          <dgm:choose name="Name4">
-            <dgm:if name="Name5" axis="par ch" ptType="doc node" func="cnt" op="gte" val="2">
-              <dgm:forEach name="Name6" axis="followSib" ptType="sibTrans" cnt="1">
-                <dgm:layoutNode name="spacer">
-                  <dgm:alg type="sp"/>
-                  <dgm:shape xmlns:r="http://schemas.openxmlformats.org/officeDocument/2006/relationships" r:blip="">
-                    <dgm:adjLst/>
-                  </dgm:shape>
-                  <dgm:presOf/>
-                  <dgm:constrLst/>
-                  <dgm:ruleLst/>
-                </dgm:layoutNode>
-              </dgm:forEach>
-            </dgm:if>
-            <dgm:else name="Name7"/>
-          </dgm:choose>
-        </dgm:else>
-      </dgm:choose>
-    </dgm:forEach>
-  </dgm:layoutNode>
-</dgm:layoutDef>
-</file>
-
 <file path=ppt/diagrams/quickStyle1.xml><?xml version="1.0" encoding="utf-8"?>
 <dgm:styleDef xmlns:dgm="http://schemas.openxmlformats.org/drawingml/2006/diagram" xmlns:a="http://schemas.openxmlformats.org/drawingml/2006/main" uniqueId="urn:microsoft.com/office/officeart/2005/8/quickstyle/simple1">
   <dgm:title val=""/>
@@ -5914,1040 +4163,6 @@
 </file>
 
 <file path=ppt/diagrams/quickStyle2.xml><?xml version="1.0" encoding="utf-8"?>
-<dgm:styleDef xmlns:dgm="http://schemas.openxmlformats.org/drawingml/2006/diagram" xmlns:a="http://schemas.openxmlformats.org/drawingml/2006/main" uniqueId="urn:microsoft.com/office/officeart/2005/8/quickstyle/simple1">
-  <dgm:title val=""/>
-  <dgm:desc val=""/>
-  <dgm:catLst>
-    <dgm:cat type="simple" pri="10100"/>
-  </dgm:catLst>
-  <dgm:scene3d>
-    <a:camera prst="orthographicFront"/>
-    <a:lightRig rig="threePt" dir="t"/>
-  </dgm:scene3d>
-  <dgm:styleLbl name="node0">
-    <dgm:scene3d>
-      <a:camera prst="orthographicFront"/>
-      <a:lightRig rig="threePt" dir="t"/>
-    </dgm:scene3d>
-    <dgm:sp3d/>
-    <dgm:txPr/>
-    <dgm:style>
-      <a:lnRef idx="2">
-        <a:scrgbClr r="0" g="0" b="0"/>
-      </a:lnRef>
-      <a:fillRef idx="1">
-        <a:scrgbClr r="0" g="0" b="0"/>
-      </a:fillRef>
-      <a:effectRef idx="0">
-        <a:scrgbClr r="0" g="0" b="0"/>
-      </a:effectRef>
-      <a:fontRef idx="minor">
-        <a:schemeClr val="lt1"/>
-      </a:fontRef>
-    </dgm:style>
-  </dgm:styleLbl>
-  <dgm:styleLbl name="lnNode1">
-    <dgm:scene3d>
-      <a:camera prst="orthographicFront"/>
-      <a:lightRig rig="threePt" dir="t"/>
-    </dgm:scene3d>
-    <dgm:sp3d/>
-    <dgm:txPr/>
-    <dgm:style>
-      <a:lnRef idx="2">
-        <a:scrgbClr r="0" g="0" b="0"/>
-      </a:lnRef>
-      <a:fillRef idx="1">
-        <a:scrgbClr r="0" g="0" b="0"/>
-      </a:fillRef>
-      <a:effectRef idx="0">
-        <a:scrgbClr r="0" g="0" b="0"/>
-      </a:effectRef>
-      <a:fontRef idx="minor">
-        <a:schemeClr val="lt1"/>
-      </a:fontRef>
-    </dgm:style>
-  </dgm:styleLbl>
-  <dgm:styleLbl name="vennNode1">
-    <dgm:scene3d>
-      <a:camera prst="orthographicFront"/>
-      <a:lightRig rig="threePt" dir="t"/>
-    </dgm:scene3d>
-    <dgm:sp3d/>
-    <dgm:txPr/>
-    <dgm:style>
-      <a:lnRef idx="2">
-        <a:scrgbClr r="0" g="0" b="0"/>
-      </a:lnRef>
-      <a:fillRef idx="1">
-        <a:scrgbClr r="0" g="0" b="0"/>
-      </a:fillRef>
-      <a:effectRef idx="0">
-        <a:scrgbClr r="0" g="0" b="0"/>
-      </a:effectRef>
-      <a:fontRef idx="minor">
-        <a:schemeClr val="tx1"/>
-      </a:fontRef>
-    </dgm:style>
-  </dgm:styleLbl>
-  <dgm:styleLbl name="alignNode1">
-    <dgm:scene3d>
-      <a:camera prst="orthographicFront"/>
-      <a:lightRig rig="threePt" dir="t"/>
-    </dgm:scene3d>
-    <dgm:sp3d/>
-    <dgm:txPr/>
-    <dgm:style>
-      <a:lnRef idx="2">
-        <a:scrgbClr r="0" g="0" b="0"/>
-      </a:lnRef>
-      <a:fillRef idx="1">
-        <a:scrgbClr r="0" g="0" b="0"/>
-      </a:fillRef>
-      <a:effectRef idx="0">
-        <a:scrgbClr r="0" g="0" b="0"/>
-      </a:effectRef>
-      <a:fontRef idx="minor">
-        <a:schemeClr val="lt1"/>
-      </a:fontRef>
-    </dgm:style>
-  </dgm:styleLbl>
-  <dgm:styleLbl name="node1">
-    <dgm:scene3d>
-      <a:camera prst="orthographicFront"/>
-      <a:lightRig rig="threePt" dir="t"/>
-    </dgm:scene3d>
-    <dgm:sp3d/>
-    <dgm:txPr/>
-    <dgm:style>
-      <a:lnRef idx="2">
-        <a:scrgbClr r="0" g="0" b="0"/>
-      </a:lnRef>
-      <a:fillRef idx="1">
-        <a:scrgbClr r="0" g="0" b="0"/>
-      </a:fillRef>
-      <a:effectRef idx="0">
-        <a:scrgbClr r="0" g="0" b="0"/>
-      </a:effectRef>
-      <a:fontRef idx="minor">
-        <a:schemeClr val="lt1"/>
-      </a:fontRef>
-    </dgm:style>
-  </dgm:styleLbl>
-  <dgm:styleLbl name="node2">
-    <dgm:scene3d>
-      <a:camera prst="orthographicFront"/>
-      <a:lightRig rig="threePt" dir="t"/>
-    </dgm:scene3d>
-    <dgm:sp3d/>
-    <dgm:txPr/>
-    <dgm:style>
-      <a:lnRef idx="2">
-        <a:scrgbClr r="0" g="0" b="0"/>
-      </a:lnRef>
-      <a:fillRef idx="1">
-        <a:scrgbClr r="0" g="0" b="0"/>
-      </a:fillRef>
-      <a:effectRef idx="0">
-        <a:scrgbClr r="0" g="0" b="0"/>
-      </a:effectRef>
-      <a:fontRef idx="minor">
-        <a:schemeClr val="lt1"/>
-      </a:fontRef>
-    </dgm:style>
-  </dgm:styleLbl>
-  <dgm:styleLbl name="node3">
-    <dgm:scene3d>
-      <a:camera prst="orthographicFront"/>
-      <a:lightRig rig="threePt" dir="t"/>
-    </dgm:scene3d>
-    <dgm:sp3d/>
-    <dgm:txPr/>
-    <dgm:style>
-      <a:lnRef idx="2">
-        <a:scrgbClr r="0" g="0" b="0"/>
-      </a:lnRef>
-      <a:fillRef idx="1">
-        <a:scrgbClr r="0" g="0" b="0"/>
-      </a:fillRef>
-      <a:effectRef idx="0">
-        <a:scrgbClr r="0" g="0" b="0"/>
-      </a:effectRef>
-      <a:fontRef idx="minor">
-        <a:schemeClr val="lt1"/>
-      </a:fontRef>
-    </dgm:style>
-  </dgm:styleLbl>
-  <dgm:styleLbl name="node4">
-    <dgm:scene3d>
-      <a:camera prst="orthographicFront"/>
-      <a:lightRig rig="threePt" dir="t"/>
-    </dgm:scene3d>
-    <dgm:sp3d/>
-    <dgm:txPr/>
-    <dgm:style>
-      <a:lnRef idx="2">
-        <a:scrgbClr r="0" g="0" b="0"/>
-      </a:lnRef>
-      <a:fillRef idx="1">
-        <a:scrgbClr r="0" g="0" b="0"/>
-      </a:fillRef>
-      <a:effectRef idx="0">
-        <a:scrgbClr r="0" g="0" b="0"/>
-      </a:effectRef>
-      <a:fontRef idx="minor">
-        <a:schemeClr val="lt1"/>
-      </a:fontRef>
-    </dgm:style>
-  </dgm:styleLbl>
-  <dgm:styleLbl name="fgImgPlace1">
-    <dgm:scene3d>
-      <a:camera prst="orthographicFront"/>
-      <a:lightRig rig="threePt" dir="t"/>
-    </dgm:scene3d>
-    <dgm:sp3d/>
-    <dgm:txPr/>
-    <dgm:style>
-      <a:lnRef idx="2">
-        <a:scrgbClr r="0" g="0" b="0"/>
-      </a:lnRef>
-      <a:fillRef idx="1">
-        <a:scrgbClr r="0" g="0" b="0"/>
-      </a:fillRef>
-      <a:effectRef idx="0">
-        <a:scrgbClr r="0" g="0" b="0"/>
-      </a:effectRef>
-      <a:fontRef idx="minor"/>
-    </dgm:style>
-  </dgm:styleLbl>
-  <dgm:styleLbl name="alignImgPlace1">
-    <dgm:scene3d>
-      <a:camera prst="orthographicFront"/>
-      <a:lightRig rig="threePt" dir="t"/>
-    </dgm:scene3d>
-    <dgm:sp3d/>
-    <dgm:txPr/>
-    <dgm:style>
-      <a:lnRef idx="2">
-        <a:scrgbClr r="0" g="0" b="0"/>
-      </a:lnRef>
-      <a:fillRef idx="1">
-        <a:scrgbClr r="0" g="0" b="0"/>
-      </a:fillRef>
-      <a:effectRef idx="0">
-        <a:scrgbClr r="0" g="0" b="0"/>
-      </a:effectRef>
-      <a:fontRef idx="minor"/>
-    </dgm:style>
-  </dgm:styleLbl>
-  <dgm:styleLbl name="bgImgPlace1">
-    <dgm:scene3d>
-      <a:camera prst="orthographicFront"/>
-      <a:lightRig rig="threePt" dir="t"/>
-    </dgm:scene3d>
-    <dgm:sp3d/>
-    <dgm:txPr/>
-    <dgm:style>
-      <a:lnRef idx="2">
-        <a:scrgbClr r="0" g="0" b="0"/>
-      </a:lnRef>
-      <a:fillRef idx="1">
-        <a:scrgbClr r="0" g="0" b="0"/>
-      </a:fillRef>
-      <a:effectRef idx="0">
-        <a:scrgbClr r="0" g="0" b="0"/>
-      </a:effectRef>
-      <a:fontRef idx="minor"/>
-    </dgm:style>
-  </dgm:styleLbl>
-  <dgm:styleLbl name="sibTrans2D1">
-    <dgm:scene3d>
-      <a:camera prst="orthographicFront"/>
-      <a:lightRig rig="threePt" dir="t"/>
-    </dgm:scene3d>
-    <dgm:sp3d/>
-    <dgm:txPr/>
-    <dgm:style>
-      <a:lnRef idx="0">
-        <a:scrgbClr r="0" g="0" b="0"/>
-      </a:lnRef>
-      <a:fillRef idx="1">
-        <a:scrgbClr r="0" g="0" b="0"/>
-      </a:fillRef>
-      <a:effectRef idx="0">
-        <a:scrgbClr r="0" g="0" b="0"/>
-      </a:effectRef>
-      <a:fontRef idx="minor">
-        <a:schemeClr val="lt1"/>
-      </a:fontRef>
-    </dgm:style>
-  </dgm:styleLbl>
-  <dgm:styleLbl name="fgSibTrans2D1">
-    <dgm:scene3d>
-      <a:camera prst="orthographicFront"/>
-      <a:lightRig rig="threePt" dir="t"/>
-    </dgm:scene3d>
-    <dgm:sp3d/>
-    <dgm:txPr/>
-    <dgm:style>
-      <a:lnRef idx="0">
-        <a:scrgbClr r="0" g="0" b="0"/>
-      </a:lnRef>
-      <a:fillRef idx="1">
-        <a:scrgbClr r="0" g="0" b="0"/>
-      </a:fillRef>
-      <a:effectRef idx="0">
-        <a:scrgbClr r="0" g="0" b="0"/>
-      </a:effectRef>
-      <a:fontRef idx="minor">
-        <a:schemeClr val="lt1"/>
-      </a:fontRef>
-    </dgm:style>
-  </dgm:styleLbl>
-  <dgm:styleLbl name="bgSibTrans2D1">
-    <dgm:scene3d>
-      <a:camera prst="orthographicFront"/>
-      <a:lightRig rig="threePt" dir="t"/>
-    </dgm:scene3d>
-    <dgm:sp3d/>
-    <dgm:txPr/>
-    <dgm:style>
-      <a:lnRef idx="0">
-        <a:scrgbClr r="0" g="0" b="0"/>
-      </a:lnRef>
-      <a:fillRef idx="1">
-        <a:scrgbClr r="0" g="0" b="0"/>
-      </a:fillRef>
-      <a:effectRef idx="0">
-        <a:scrgbClr r="0" g="0" b="0"/>
-      </a:effectRef>
-      <a:fontRef idx="minor">
-        <a:schemeClr val="lt1"/>
-      </a:fontRef>
-    </dgm:style>
-  </dgm:styleLbl>
-  <dgm:styleLbl name="sibTrans1D1">
-    <dgm:scene3d>
-      <a:camera prst="orthographicFront"/>
-      <a:lightRig rig="threePt" dir="t"/>
-    </dgm:scene3d>
-    <dgm:sp3d/>
-    <dgm:txPr/>
-    <dgm:style>
-      <a:lnRef idx="1">
-        <a:scrgbClr r="0" g="0" b="0"/>
-      </a:lnRef>
-      <a:fillRef idx="0">
-        <a:scrgbClr r="0" g="0" b="0"/>
-      </a:fillRef>
-      <a:effectRef idx="0">
-        <a:scrgbClr r="0" g="0" b="0"/>
-      </a:effectRef>
-      <a:fontRef idx="minor"/>
-    </dgm:style>
-  </dgm:styleLbl>
-  <dgm:styleLbl name="callout">
-    <dgm:scene3d>
-      <a:camera prst="orthographicFront"/>
-      <a:lightRig rig="threePt" dir="t"/>
-    </dgm:scene3d>
-    <dgm:sp3d/>
-    <dgm:txPr/>
-    <dgm:style>
-      <a:lnRef idx="2">
-        <a:scrgbClr r="0" g="0" b="0"/>
-      </a:lnRef>
-      <a:fillRef idx="1">
-        <a:scrgbClr r="0" g="0" b="0"/>
-      </a:fillRef>
-      <a:effectRef idx="0">
-        <a:scrgbClr r="0" g="0" b="0"/>
-      </a:effectRef>
-      <a:fontRef idx="minor"/>
-    </dgm:style>
-  </dgm:styleLbl>
-  <dgm:styleLbl name="asst0">
-    <dgm:scene3d>
-      <a:camera prst="orthographicFront"/>
-      <a:lightRig rig="threePt" dir="t"/>
-    </dgm:scene3d>
-    <dgm:sp3d/>
-    <dgm:txPr/>
-    <dgm:style>
-      <a:lnRef idx="2">
-        <a:scrgbClr r="0" g="0" b="0"/>
-      </a:lnRef>
-      <a:fillRef idx="1">
-        <a:scrgbClr r="0" g="0" b="0"/>
-      </a:fillRef>
-      <a:effectRef idx="0">
-        <a:scrgbClr r="0" g="0" b="0"/>
-      </a:effectRef>
-      <a:fontRef idx="minor">
-        <a:schemeClr val="lt1"/>
-      </a:fontRef>
-    </dgm:style>
-  </dgm:styleLbl>
-  <dgm:styleLbl name="asst1">
-    <dgm:scene3d>
-      <a:camera prst="orthographicFront"/>
-      <a:lightRig rig="threePt" dir="t"/>
-    </dgm:scene3d>
-    <dgm:sp3d/>
-    <dgm:txPr/>
-    <dgm:style>
-      <a:lnRef idx="2">
-        <a:scrgbClr r="0" g="0" b="0"/>
-      </a:lnRef>
-      <a:fillRef idx="1">
-        <a:scrgbClr r="0" g="0" b="0"/>
-      </a:fillRef>
-      <a:effectRef idx="0">
-        <a:scrgbClr r="0" g="0" b="0"/>
-      </a:effectRef>
-      <a:fontRef idx="minor">
-        <a:schemeClr val="lt1"/>
-      </a:fontRef>
-    </dgm:style>
-  </dgm:styleLbl>
-  <dgm:styleLbl name="asst2">
-    <dgm:scene3d>
-      <a:camera prst="orthographicFront"/>
-      <a:lightRig rig="threePt" dir="t"/>
-    </dgm:scene3d>
-    <dgm:sp3d/>
-    <dgm:txPr/>
-    <dgm:style>
-      <a:lnRef idx="2">
-        <a:scrgbClr r="0" g="0" b="0"/>
-      </a:lnRef>
-      <a:fillRef idx="1">
-        <a:scrgbClr r="0" g="0" b="0"/>
-      </a:fillRef>
-      <a:effectRef idx="0">
-        <a:scrgbClr r="0" g="0" b="0"/>
-      </a:effectRef>
-      <a:fontRef idx="minor">
-        <a:schemeClr val="lt1"/>
-      </a:fontRef>
-    </dgm:style>
-  </dgm:styleLbl>
-  <dgm:styleLbl name="asst3">
-    <dgm:scene3d>
-      <a:camera prst="orthographicFront"/>
-      <a:lightRig rig="threePt" dir="t"/>
-    </dgm:scene3d>
-    <dgm:sp3d/>
-    <dgm:txPr/>
-    <dgm:style>
-      <a:lnRef idx="2">
-        <a:scrgbClr r="0" g="0" b="0"/>
-      </a:lnRef>
-      <a:fillRef idx="1">
-        <a:scrgbClr r="0" g="0" b="0"/>
-      </a:fillRef>
-      <a:effectRef idx="0">
-        <a:scrgbClr r="0" g="0" b="0"/>
-      </a:effectRef>
-      <a:fontRef idx="minor">
-        <a:schemeClr val="lt1"/>
-      </a:fontRef>
-    </dgm:style>
-  </dgm:styleLbl>
-  <dgm:styleLbl name="asst4">
-    <dgm:scene3d>
-      <a:camera prst="orthographicFront"/>
-      <a:lightRig rig="threePt" dir="t"/>
-    </dgm:scene3d>
-    <dgm:sp3d/>
-    <dgm:txPr/>
-    <dgm:style>
-      <a:lnRef idx="2">
-        <a:scrgbClr r="0" g="0" b="0"/>
-      </a:lnRef>
-      <a:fillRef idx="1">
-        <a:scrgbClr r="0" g="0" b="0"/>
-      </a:fillRef>
-      <a:effectRef idx="0">
-        <a:scrgbClr r="0" g="0" b="0"/>
-      </a:effectRef>
-      <a:fontRef idx="minor">
-        <a:schemeClr val="lt1"/>
-      </a:fontRef>
-    </dgm:style>
-  </dgm:styleLbl>
-  <dgm:styleLbl name="parChTrans2D1">
-    <dgm:scene3d>
-      <a:camera prst="orthographicFront"/>
-      <a:lightRig rig="threePt" dir="t"/>
-    </dgm:scene3d>
-    <dgm:sp3d/>
-    <dgm:txPr/>
-    <dgm:style>
-      <a:lnRef idx="2">
-        <a:scrgbClr r="0" g="0" b="0"/>
-      </a:lnRef>
-      <a:fillRef idx="1">
-        <a:scrgbClr r="0" g="0" b="0"/>
-      </a:fillRef>
-      <a:effectRef idx="0">
-        <a:scrgbClr r="0" g="0" b="0"/>
-      </a:effectRef>
-      <a:fontRef idx="minor">
-        <a:schemeClr val="lt1"/>
-      </a:fontRef>
-    </dgm:style>
-  </dgm:styleLbl>
-  <dgm:styleLbl name="parChTrans2D2">
-    <dgm:scene3d>
-      <a:camera prst="orthographicFront"/>
-      <a:lightRig rig="threePt" dir="t"/>
-    </dgm:scene3d>
-    <dgm:sp3d/>
-    <dgm:txPr/>
-    <dgm:style>
-      <a:lnRef idx="2">
-        <a:scrgbClr r="0" g="0" b="0"/>
-      </a:lnRef>
-      <a:fillRef idx="1">
-        <a:scrgbClr r="0" g="0" b="0"/>
-      </a:fillRef>
-      <a:effectRef idx="0">
-        <a:scrgbClr r="0" g="0" b="0"/>
-      </a:effectRef>
-      <a:fontRef idx="minor">
-        <a:schemeClr val="lt1"/>
-      </a:fontRef>
-    </dgm:style>
-  </dgm:styleLbl>
-  <dgm:styleLbl name="parChTrans2D3">
-    <dgm:scene3d>
-      <a:camera prst="orthographicFront"/>
-      <a:lightRig rig="threePt" dir="t"/>
-    </dgm:scene3d>
-    <dgm:sp3d/>
-    <dgm:txPr/>
-    <dgm:style>
-      <a:lnRef idx="2">
-        <a:scrgbClr r="0" g="0" b="0"/>
-      </a:lnRef>
-      <a:fillRef idx="1">
-        <a:scrgbClr r="0" g="0" b="0"/>
-      </a:fillRef>
-      <a:effectRef idx="0">
-        <a:scrgbClr r="0" g="0" b="0"/>
-      </a:effectRef>
-      <a:fontRef idx="minor">
-        <a:schemeClr val="lt1"/>
-      </a:fontRef>
-    </dgm:style>
-  </dgm:styleLbl>
-  <dgm:styleLbl name="parChTrans2D4">
-    <dgm:scene3d>
-      <a:camera prst="orthographicFront"/>
-      <a:lightRig rig="threePt" dir="t"/>
-    </dgm:scene3d>
-    <dgm:sp3d/>
-    <dgm:txPr/>
-    <dgm:style>
-      <a:lnRef idx="2">
-        <a:scrgbClr r="0" g="0" b="0"/>
-      </a:lnRef>
-      <a:fillRef idx="1">
-        <a:scrgbClr r="0" g="0" b="0"/>
-      </a:fillRef>
-      <a:effectRef idx="0">
-        <a:scrgbClr r="0" g="0" b="0"/>
-      </a:effectRef>
-      <a:fontRef idx="minor">
-        <a:schemeClr val="lt1"/>
-      </a:fontRef>
-    </dgm:style>
-  </dgm:styleLbl>
-  <dgm:styleLbl name="parChTrans1D1">
-    <dgm:scene3d>
-      <a:camera prst="orthographicFront"/>
-      <a:lightRig rig="threePt" dir="t"/>
-    </dgm:scene3d>
-    <dgm:sp3d/>
-    <dgm:txPr/>
-    <dgm:style>
-      <a:lnRef idx="2">
-        <a:scrgbClr r="0" g="0" b="0"/>
-      </a:lnRef>
-      <a:fillRef idx="0">
-        <a:scrgbClr r="0" g="0" b="0"/>
-      </a:fillRef>
-      <a:effectRef idx="0">
-        <a:scrgbClr r="0" g="0" b="0"/>
-      </a:effectRef>
-      <a:fontRef idx="minor"/>
-    </dgm:style>
-  </dgm:styleLbl>
-  <dgm:styleLbl name="parChTrans1D2">
-    <dgm:scene3d>
-      <a:camera prst="orthographicFront"/>
-      <a:lightRig rig="threePt" dir="t"/>
-    </dgm:scene3d>
-    <dgm:sp3d/>
-    <dgm:txPr/>
-    <dgm:style>
-      <a:lnRef idx="2">
-        <a:scrgbClr r="0" g="0" b="0"/>
-      </a:lnRef>
-      <a:fillRef idx="0">
-        <a:scrgbClr r="0" g="0" b="0"/>
-      </a:fillRef>
-      <a:effectRef idx="0">
-        <a:scrgbClr r="0" g="0" b="0"/>
-      </a:effectRef>
-      <a:fontRef idx="minor"/>
-    </dgm:style>
-  </dgm:styleLbl>
-  <dgm:styleLbl name="parChTrans1D3">
-    <dgm:scene3d>
-      <a:camera prst="orthographicFront"/>
-      <a:lightRig rig="threePt" dir="t"/>
-    </dgm:scene3d>
-    <dgm:sp3d/>
-    <dgm:txPr/>
-    <dgm:style>
-      <a:lnRef idx="2">
-        <a:scrgbClr r="0" g="0" b="0"/>
-      </a:lnRef>
-      <a:fillRef idx="0">
-        <a:scrgbClr r="0" g="0" b="0"/>
-      </a:fillRef>
-      <a:effectRef idx="0">
-        <a:scrgbClr r="0" g="0" b="0"/>
-      </a:effectRef>
-      <a:fontRef idx="minor"/>
-    </dgm:style>
-  </dgm:styleLbl>
-  <dgm:styleLbl name="parChTrans1D4">
-    <dgm:scene3d>
-      <a:camera prst="orthographicFront"/>
-      <a:lightRig rig="threePt" dir="t"/>
-    </dgm:scene3d>
-    <dgm:sp3d/>
-    <dgm:txPr/>
-    <dgm:style>
-      <a:lnRef idx="2">
-        <a:scrgbClr r="0" g="0" b="0"/>
-      </a:lnRef>
-      <a:fillRef idx="0">
-        <a:scrgbClr r="0" g="0" b="0"/>
-      </a:fillRef>
-      <a:effectRef idx="0">
-        <a:scrgbClr r="0" g="0" b="0"/>
-      </a:effectRef>
-      <a:fontRef idx="minor"/>
-    </dgm:style>
-  </dgm:styleLbl>
-  <dgm:styleLbl name="fgAcc1">
-    <dgm:scene3d>
-      <a:camera prst="orthographicFront"/>
-      <a:lightRig rig="threePt" dir="t"/>
-    </dgm:scene3d>
-    <dgm:sp3d/>
-    <dgm:txPr/>
-    <dgm:style>
-      <a:lnRef idx="2">
-        <a:scrgbClr r="0" g="0" b="0"/>
-      </a:lnRef>
-      <a:fillRef idx="1">
-        <a:scrgbClr r="0" g="0" b="0"/>
-      </a:fillRef>
-      <a:effectRef idx="0">
-        <a:scrgbClr r="0" g="0" b="0"/>
-      </a:effectRef>
-      <a:fontRef idx="minor"/>
-    </dgm:style>
-  </dgm:styleLbl>
-  <dgm:styleLbl name="conFgAcc1">
-    <dgm:scene3d>
-      <a:camera prst="orthographicFront"/>
-      <a:lightRig rig="threePt" dir="t"/>
-    </dgm:scene3d>
-    <dgm:sp3d/>
-    <dgm:txPr/>
-    <dgm:style>
-      <a:lnRef idx="2">
-        <a:scrgbClr r="0" g="0" b="0"/>
-      </a:lnRef>
-      <a:fillRef idx="1">
-        <a:scrgbClr r="0" g="0" b="0"/>
-      </a:fillRef>
-      <a:effectRef idx="0">
-        <a:scrgbClr r="0" g="0" b="0"/>
-      </a:effectRef>
-      <a:fontRef idx="minor"/>
-    </dgm:style>
-  </dgm:styleLbl>
-  <dgm:styleLbl name="alignAcc1">
-    <dgm:scene3d>
-      <a:camera prst="orthographicFront"/>
-      <a:lightRig rig="threePt" dir="t"/>
-    </dgm:scene3d>
-    <dgm:sp3d/>
-    <dgm:txPr/>
-    <dgm:style>
-      <a:lnRef idx="2">
-        <a:scrgbClr r="0" g="0" b="0"/>
-      </a:lnRef>
-      <a:fillRef idx="1">
-        <a:scrgbClr r="0" g="0" b="0"/>
-      </a:fillRef>
-      <a:effectRef idx="0">
-        <a:scrgbClr r="0" g="0" b="0"/>
-      </a:effectRef>
-      <a:fontRef idx="minor"/>
-    </dgm:style>
-  </dgm:styleLbl>
-  <dgm:styleLbl name="trAlignAcc1">
-    <dgm:scene3d>
-      <a:camera prst="orthographicFront"/>
-      <a:lightRig rig="threePt" dir="t"/>
-    </dgm:scene3d>
-    <dgm:sp3d/>
-    <dgm:txPr/>
-    <dgm:style>
-      <a:lnRef idx="1">
-        <a:scrgbClr r="0" g="0" b="0"/>
-      </a:lnRef>
-      <a:fillRef idx="1">
-        <a:scrgbClr r="0" g="0" b="0"/>
-      </a:fillRef>
-      <a:effectRef idx="0">
-        <a:scrgbClr r="0" g="0" b="0"/>
-      </a:effectRef>
-      <a:fontRef idx="minor"/>
-    </dgm:style>
-  </dgm:styleLbl>
-  <dgm:styleLbl name="bgAcc1">
-    <dgm:scene3d>
-      <a:camera prst="orthographicFront"/>
-      <a:lightRig rig="threePt" dir="t"/>
-    </dgm:scene3d>
-    <dgm:sp3d/>
-    <dgm:txPr/>
-    <dgm:style>
-      <a:lnRef idx="2">
-        <a:scrgbClr r="0" g="0" b="0"/>
-      </a:lnRef>
-      <a:fillRef idx="1">
-        <a:scrgbClr r="0" g="0" b="0"/>
-      </a:fillRef>
-      <a:effectRef idx="0">
-        <a:scrgbClr r="0" g="0" b="0"/>
-      </a:effectRef>
-      <a:fontRef idx="minor"/>
-    </dgm:style>
-  </dgm:styleLbl>
-  <dgm:styleLbl name="solidFgAcc1">
-    <dgm:scene3d>
-      <a:camera prst="orthographicFront"/>
-      <a:lightRig rig="threePt" dir="t"/>
-    </dgm:scene3d>
-    <dgm:sp3d/>
-    <dgm:txPr/>
-    <dgm:style>
-      <a:lnRef idx="2">
-        <a:scrgbClr r="0" g="0" b="0"/>
-      </a:lnRef>
-      <a:fillRef idx="1">
-        <a:scrgbClr r="0" g="0" b="0"/>
-      </a:fillRef>
-      <a:effectRef idx="0">
-        <a:scrgbClr r="0" g="0" b="0"/>
-      </a:effectRef>
-      <a:fontRef idx="minor"/>
-    </dgm:style>
-  </dgm:styleLbl>
-  <dgm:styleLbl name="solidAlignAcc1">
-    <dgm:scene3d>
-      <a:camera prst="orthographicFront"/>
-      <a:lightRig rig="threePt" dir="t"/>
-    </dgm:scene3d>
-    <dgm:sp3d/>
-    <dgm:txPr/>
-    <dgm:style>
-      <a:lnRef idx="2">
-        <a:scrgbClr r="0" g="0" b="0"/>
-      </a:lnRef>
-      <a:fillRef idx="1">
-        <a:scrgbClr r="0" g="0" b="0"/>
-      </a:fillRef>
-      <a:effectRef idx="0">
-        <a:scrgbClr r="0" g="0" b="0"/>
-      </a:effectRef>
-      <a:fontRef idx="minor"/>
-    </dgm:style>
-  </dgm:styleLbl>
-  <dgm:styleLbl name="solidBgAcc1">
-    <dgm:scene3d>
-      <a:camera prst="orthographicFront"/>
-      <a:lightRig rig="threePt" dir="t"/>
-    </dgm:scene3d>
-    <dgm:sp3d/>
-    <dgm:txPr/>
-    <dgm:style>
-      <a:lnRef idx="2">
-        <a:scrgbClr r="0" g="0" b="0"/>
-      </a:lnRef>
-      <a:fillRef idx="1">
-        <a:scrgbClr r="0" g="0" b="0"/>
-      </a:fillRef>
-      <a:effectRef idx="0">
-        <a:scrgbClr r="0" g="0" b="0"/>
-      </a:effectRef>
-      <a:fontRef idx="minor"/>
-    </dgm:style>
-  </dgm:styleLbl>
-  <dgm:styleLbl name="fgAccFollowNode1">
-    <dgm:scene3d>
-      <a:camera prst="orthographicFront"/>
-      <a:lightRig rig="threePt" dir="t"/>
-    </dgm:scene3d>
-    <dgm:sp3d/>
-    <dgm:txPr/>
-    <dgm:style>
-      <a:lnRef idx="2">
-        <a:scrgbClr r="0" g="0" b="0"/>
-      </a:lnRef>
-      <a:fillRef idx="1">
-        <a:scrgbClr r="0" g="0" b="0"/>
-      </a:fillRef>
-      <a:effectRef idx="0">
-        <a:scrgbClr r="0" g="0" b="0"/>
-      </a:effectRef>
-      <a:fontRef idx="minor"/>
-    </dgm:style>
-  </dgm:styleLbl>
-  <dgm:styleLbl name="alignAccFollowNode1">
-    <dgm:scene3d>
-      <a:camera prst="orthographicFront"/>
-      <a:lightRig rig="threePt" dir="t"/>
-    </dgm:scene3d>
-    <dgm:sp3d/>
-    <dgm:txPr/>
-    <dgm:style>
-      <a:lnRef idx="2">
-        <a:scrgbClr r="0" g="0" b="0"/>
-      </a:lnRef>
-      <a:fillRef idx="1">
-        <a:scrgbClr r="0" g="0" b="0"/>
-      </a:fillRef>
-      <a:effectRef idx="0">
-        <a:scrgbClr r="0" g="0" b="0"/>
-      </a:effectRef>
-      <a:fontRef idx="minor"/>
-    </dgm:style>
-  </dgm:styleLbl>
-  <dgm:styleLbl name="bgAccFollowNode1">
-    <dgm:scene3d>
-      <a:camera prst="orthographicFront"/>
-      <a:lightRig rig="threePt" dir="t"/>
-    </dgm:scene3d>
-    <dgm:sp3d/>
-    <dgm:txPr/>
-    <dgm:style>
-      <a:lnRef idx="2">
-        <a:scrgbClr r="0" g="0" b="0"/>
-      </a:lnRef>
-      <a:fillRef idx="1">
-        <a:scrgbClr r="0" g="0" b="0"/>
-      </a:fillRef>
-      <a:effectRef idx="0">
-        <a:scrgbClr r="0" g="0" b="0"/>
-      </a:effectRef>
-      <a:fontRef idx="minor"/>
-    </dgm:style>
-  </dgm:styleLbl>
-  <dgm:styleLbl name="fgAcc0">
-    <dgm:scene3d>
-      <a:camera prst="orthographicFront"/>
-      <a:lightRig rig="threePt" dir="t"/>
-    </dgm:scene3d>
-    <dgm:sp3d/>
-    <dgm:txPr/>
-    <dgm:style>
-      <a:lnRef idx="2">
-        <a:scrgbClr r="0" g="0" b="0"/>
-      </a:lnRef>
-      <a:fillRef idx="1">
-        <a:scrgbClr r="0" g="0" b="0"/>
-      </a:fillRef>
-      <a:effectRef idx="0">
-        <a:scrgbClr r="0" g="0" b="0"/>
-      </a:effectRef>
-      <a:fontRef idx="minor"/>
-    </dgm:style>
-  </dgm:styleLbl>
-  <dgm:styleLbl name="fgAcc2">
-    <dgm:scene3d>
-      <a:camera prst="orthographicFront"/>
-      <a:lightRig rig="threePt" dir="t"/>
-    </dgm:scene3d>
-    <dgm:sp3d/>
-    <dgm:txPr/>
-    <dgm:style>
-      <a:lnRef idx="2">
-        <a:scrgbClr r="0" g="0" b="0"/>
-      </a:lnRef>
-      <a:fillRef idx="1">
-        <a:scrgbClr r="0" g="0" b="0"/>
-      </a:fillRef>
-      <a:effectRef idx="0">
-        <a:scrgbClr r="0" g="0" b="0"/>
-      </a:effectRef>
-      <a:fontRef idx="minor"/>
-    </dgm:style>
-  </dgm:styleLbl>
-  <dgm:styleLbl name="fgAcc3">
-    <dgm:scene3d>
-      <a:camera prst="orthographicFront"/>
-      <a:lightRig rig="threePt" dir="t"/>
-    </dgm:scene3d>
-    <dgm:sp3d/>
-    <dgm:txPr/>
-    <dgm:style>
-      <a:lnRef idx="2">
-        <a:scrgbClr r="0" g="0" b="0"/>
-      </a:lnRef>
-      <a:fillRef idx="1">
-        <a:scrgbClr r="0" g="0" b="0"/>
-      </a:fillRef>
-      <a:effectRef idx="0">
-        <a:scrgbClr r="0" g="0" b="0"/>
-      </a:effectRef>
-      <a:fontRef idx="minor"/>
-    </dgm:style>
-  </dgm:styleLbl>
-  <dgm:styleLbl name="fgAcc4">
-    <dgm:scene3d>
-      <a:camera prst="orthographicFront"/>
-      <a:lightRig rig="threePt" dir="t"/>
-    </dgm:scene3d>
-    <dgm:sp3d/>
-    <dgm:txPr/>
-    <dgm:style>
-      <a:lnRef idx="2">
-        <a:scrgbClr r="0" g="0" b="0"/>
-      </a:lnRef>
-      <a:fillRef idx="1">
-        <a:scrgbClr r="0" g="0" b="0"/>
-      </a:fillRef>
-      <a:effectRef idx="0">
-        <a:scrgbClr r="0" g="0" b="0"/>
-      </a:effectRef>
-      <a:fontRef idx="minor"/>
-    </dgm:style>
-  </dgm:styleLbl>
-  <dgm:styleLbl name="bgShp">
-    <dgm:scene3d>
-      <a:camera prst="orthographicFront"/>
-      <a:lightRig rig="threePt" dir="t"/>
-    </dgm:scene3d>
-    <dgm:sp3d/>
-    <dgm:txPr/>
-    <dgm:style>
-      <a:lnRef idx="0">
-        <a:scrgbClr r="0" g="0" b="0"/>
-      </a:lnRef>
-      <a:fillRef idx="1">
-        <a:scrgbClr r="0" g="0" b="0"/>
-      </a:fillRef>
-      <a:effectRef idx="0">
-        <a:scrgbClr r="0" g="0" b="0"/>
-      </a:effectRef>
-      <a:fontRef idx="minor"/>
-    </dgm:style>
-  </dgm:styleLbl>
-  <dgm:styleLbl name="dkBgShp">
-    <dgm:scene3d>
-      <a:camera prst="orthographicFront"/>
-      <a:lightRig rig="threePt" dir="t"/>
-    </dgm:scene3d>
-    <dgm:sp3d/>
-    <dgm:txPr/>
-    <dgm:style>
-      <a:lnRef idx="0">
-        <a:scrgbClr r="0" g="0" b="0"/>
-      </a:lnRef>
-      <a:fillRef idx="1">
-        <a:scrgbClr r="0" g="0" b="0"/>
-      </a:fillRef>
-      <a:effectRef idx="0">
-        <a:scrgbClr r="0" g="0" b="0"/>
-      </a:effectRef>
-      <a:fontRef idx="minor"/>
-    </dgm:style>
-  </dgm:styleLbl>
-  <dgm:styleLbl name="trBgShp">
-    <dgm:scene3d>
-      <a:camera prst="orthographicFront"/>
-      <a:lightRig rig="threePt" dir="t"/>
-    </dgm:scene3d>
-    <dgm:sp3d/>
-    <dgm:txPr/>
-    <dgm:style>
-      <a:lnRef idx="0">
-        <a:scrgbClr r="0" g="0" b="0"/>
-      </a:lnRef>
-      <a:fillRef idx="1">
-        <a:scrgbClr r="0" g="0" b="0"/>
-      </a:fillRef>
-      <a:effectRef idx="0">
-        <a:scrgbClr r="0" g="0" b="0"/>
-      </a:effectRef>
-      <a:fontRef idx="minor"/>
-    </dgm:style>
-  </dgm:styleLbl>
-  <dgm:styleLbl name="fgShp">
-    <dgm:scene3d>
-      <a:camera prst="orthographicFront"/>
-      <a:lightRig rig="threePt" dir="t"/>
-    </dgm:scene3d>
-    <dgm:sp3d/>
-    <dgm:txPr/>
-    <dgm:style>
-      <a:lnRef idx="2">
-        <a:scrgbClr r="0" g="0" b="0"/>
-      </a:lnRef>
-      <a:fillRef idx="1">
-        <a:scrgbClr r="0" g="0" b="0"/>
-      </a:fillRef>
-      <a:effectRef idx="0">
-        <a:scrgbClr r="0" g="0" b="0"/>
-      </a:effectRef>
-      <a:fontRef idx="minor"/>
-    </dgm:style>
-  </dgm:styleLbl>
-  <dgm:styleLbl name="revTx">
-    <dgm:scene3d>
-      <a:camera prst="orthographicFront"/>
-      <a:lightRig rig="threePt" dir="t"/>
-    </dgm:scene3d>
-    <dgm:sp3d/>
-    <dgm:txPr/>
-    <dgm:style>
-      <a:lnRef idx="0">
-        <a:scrgbClr r="0" g="0" b="0"/>
-      </a:lnRef>
-      <a:fillRef idx="0">
-        <a:scrgbClr r="0" g="0" b="0"/>
-      </a:fillRef>
-      <a:effectRef idx="0">
-        <a:scrgbClr r="0" g="0" b="0"/>
-      </a:effectRef>
-      <a:fontRef idx="minor"/>
-    </dgm:style>
-  </dgm:styleLbl>
-</dgm:styleDef>
-</file>
-
-<file path=ppt/diagrams/quickStyle3.xml><?xml version="1.0" encoding="utf-8"?>
 <dgm:styleDef xmlns:dgm="http://schemas.openxmlformats.org/drawingml/2006/diagram" xmlns:a="http://schemas.openxmlformats.org/drawingml/2006/main" uniqueId="urn:microsoft.com/office/officeart/2005/8/quickstyle/simple1">
   <dgm:title val=""/>
   <dgm:desc val=""/>
@@ -8207,7 +5422,7 @@
           <a:p>
             <a:fld id="{78ABE3C1-DBE1-495D-B57B-2849774B866A}" type="datetimeFigureOut">
               <a:rPr lang="en-US" smtClean="0"/>
-              <a:t>10/15/2022</a:t>
+              <a:t>10/16/2022</a:t>
             </a:fld>
             <a:endParaRPr lang="en-US" dirty="0"/>
           </a:p>
@@ -8415,7 +5630,7 @@
           <a:p>
             <a:fld id="{1FA3F48C-C7C6-4055-9F49-3777875E72AE}" type="datetimeFigureOut">
               <a:rPr lang="en-US" smtClean="0"/>
-              <a:t>10/15/2022</a:t>
+              <a:t>10/16/2022</a:t>
             </a:fld>
             <a:endParaRPr lang="en-US" dirty="0"/>
           </a:p>
@@ -8671,7 +5886,7 @@
           <a:p>
             <a:fld id="{6178E61D-D431-422C-9764-11DAFE33AB63}" type="datetimeFigureOut">
               <a:rPr lang="en-US" smtClean="0"/>
-              <a:t>10/15/2022</a:t>
+              <a:t>10/16/2022</a:t>
             </a:fld>
             <a:endParaRPr lang="en-US" dirty="0"/>
           </a:p>
@@ -8842,7 +6057,7 @@
           <a:p>
             <a:fld id="{12DE42F4-6EEF-4EF7-8ED4-2208F0F89A08}" type="datetimeFigureOut">
               <a:rPr lang="en-US" smtClean="0"/>
-              <a:t>10/15/2022</a:t>
+              <a:t>10/16/2022</a:t>
             </a:fld>
             <a:endParaRPr lang="en-US" dirty="0"/>
           </a:p>
@@ -9185,7 +6400,7 @@
           <a:p>
             <a:fld id="{30578ACC-22D6-47C1-A373-4FD133E34F3C}" type="datetimeFigureOut">
               <a:rPr lang="en-US" smtClean="0"/>
-              <a:t>10/15/2022</a:t>
+              <a:t>10/16/2022</a:t>
             </a:fld>
             <a:endParaRPr lang="en-US" dirty="0"/>
           </a:p>
@@ -9460,7 +6675,7 @@
           <a:p>
             <a:fld id="{4E5A6C69-6797-4E8A-BF37-F2C3751466E9}" type="datetimeFigureOut">
               <a:rPr lang="en-US" smtClean="0"/>
-              <a:t>10/15/2022</a:t>
+              <a:t>10/16/2022</a:t>
             </a:fld>
             <a:endParaRPr lang="en-US" dirty="0"/>
           </a:p>
@@ -9839,7 +7054,7 @@
           <a:p>
             <a:fld id="{D82014A1-A632-4878-A0D3-F52BA7563730}" type="datetimeFigureOut">
               <a:rPr lang="en-US" smtClean="0"/>
-              <a:t>10/15/2022</a:t>
+              <a:t>10/16/2022</a:t>
             </a:fld>
             <a:endParaRPr lang="en-US" dirty="0"/>
           </a:p>
@@ -9957,7 +7172,7 @@
           <a:p>
             <a:fld id="{CE99F462-093F-4566-844B-4C71F2739DA5}" type="datetimeFigureOut">
               <a:rPr lang="en-US" smtClean="0"/>
-              <a:t>10/15/2022</a:t>
+              <a:t>10/16/2022</a:t>
             </a:fld>
             <a:endParaRPr lang="en-US" dirty="0"/>
           </a:p>
@@ -10128,7 +7343,7 @@
           <a:p>
             <a:fld id="{3D24A7AC-904D-4781-85BA-7D10C17ED021}" type="datetimeFigureOut">
               <a:rPr lang="en-US" smtClean="0"/>
-              <a:t>10/15/2022</a:t>
+              <a:t>10/16/2022</a:t>
             </a:fld>
             <a:endParaRPr lang="en-US" dirty="0"/>
           </a:p>
@@ -10482,7 +7697,7 @@
           <a:p>
             <a:fld id="{E331444B-B92B-4E27-8C94-BB93EAF5CB18}" type="datetimeFigureOut">
               <a:rPr lang="en-US" smtClean="0"/>
-              <a:t>10/15/2022</a:t>
+              <a:t>10/16/2022</a:t>
             </a:fld>
             <a:endParaRPr lang="en-US" dirty="0"/>
           </a:p>
@@ -10859,7 +8074,7 @@
           <a:p>
             <a:fld id="{363EFA5E-FA76-400D-B3DC-F0BA90E6D107}" type="datetimeFigureOut">
               <a:rPr lang="en-US" smtClean="0"/>
-              <a:t>10/15/2022</a:t>
+              <a:t>10/16/2022</a:t>
             </a:fld>
             <a:endParaRPr lang="en-US" dirty="0"/>
           </a:p>
@@ -11146,7 +8361,7 @@
           <a:p>
             <a:fld id="{9D6E9DEC-419B-4CC5-A080-3B06BD5A8291}" type="datetimeFigureOut">
               <a:rPr lang="en-US" smtClean="0"/>
-              <a:t>10/15/2022</a:t>
+              <a:t>10/16/2022</a:t>
             </a:fld>
             <a:endParaRPr lang="en-US" dirty="0"/>
           </a:p>
@@ -11878,186 +9093,6 @@
           <a:chExt cx="0" cy="0"/>
         </a:xfrm>
       </p:grpSpPr>
-      <p:sp>
-        <p:nvSpPr>
-          <p:cNvPr id="2" name="Título 1">
-            <a:extLst>
-              <a:ext uri="{FF2B5EF4-FFF2-40B4-BE49-F238E27FC236}">
-                <a16:creationId xmlns:a16="http://schemas.microsoft.com/office/drawing/2014/main" id="{A9E37A1F-77EC-B536-EFE5-81DF26AA370D}"/>
-              </a:ext>
-            </a:extLst>
-          </p:cNvPr>
-          <p:cNvSpPr>
-            <a:spLocks noGrp="1"/>
-          </p:cNvSpPr>
-          <p:nvPr>
-            <p:ph type="title"/>
-          </p:nvPr>
-        </p:nvSpPr>
-        <p:spPr/>
-        <p:txBody>
-          <a:bodyPr/>
-          <a:lstStyle/>
-          <a:p>
-            <a:r>
-              <a:rPr lang="es-EC" b="1" dirty="0"/>
-              <a:t>Encuesta de conocimientos</a:t>
-            </a:r>
-            <a:endParaRPr lang="en-US" b="1" dirty="0"/>
-          </a:p>
-        </p:txBody>
-      </p:sp>
-      <p:sp>
-        <p:nvSpPr>
-          <p:cNvPr id="3" name="Marcador de contenido 2">
-            <a:extLst>
-              <a:ext uri="{FF2B5EF4-FFF2-40B4-BE49-F238E27FC236}">
-                <a16:creationId xmlns:a16="http://schemas.microsoft.com/office/drawing/2014/main" id="{95A13782-7CF2-B282-9B46-4055E56D489F}"/>
-              </a:ext>
-            </a:extLst>
-          </p:cNvPr>
-          <p:cNvSpPr>
-            <a:spLocks noGrp="1"/>
-          </p:cNvSpPr>
-          <p:nvPr>
-            <p:ph idx="1"/>
-          </p:nvPr>
-        </p:nvSpPr>
-        <p:spPr>
-          <a:xfrm>
-            <a:off x="4742329" y="2537135"/>
-            <a:ext cx="6243948" cy="2052671"/>
-          </a:xfrm>
-        </p:spPr>
-        <p:txBody>
-          <a:bodyPr>
-            <a:normAutofit fontScale="92500" lnSpcReduction="20000"/>
-          </a:bodyPr>
-          <a:lstStyle/>
-          <a:p>
-            <a:pPr algn="ctr"/>
-            <a:r>
-              <a:rPr lang="es-ES" sz="2800" b="1" dirty="0"/>
-              <a:t>Una encuesta anónima que nos permitirá definir detalles más específicos de la malla del curso.</a:t>
-            </a:r>
-          </a:p>
-          <a:p>
-            <a:pPr algn="ctr"/>
-            <a:r>
-              <a:rPr lang="es-ES" sz="2800" dirty="0"/>
-              <a:t>Por favor, responder con honestidad ya que con eso nos aseguraremos de que aprendamos de mejor manera.</a:t>
-            </a:r>
-            <a:endParaRPr lang="en-US" sz="2800" dirty="0"/>
-          </a:p>
-        </p:txBody>
-      </p:sp>
-      <p:pic>
-        <p:nvPicPr>
-          <p:cNvPr id="5" name="Imagen 4">
-            <a:extLst>
-              <a:ext uri="{FF2B5EF4-FFF2-40B4-BE49-F238E27FC236}">
-                <a16:creationId xmlns:a16="http://schemas.microsoft.com/office/drawing/2014/main" id="{EAA3F86C-B88A-8128-0667-14B02F12EA90}"/>
-              </a:ext>
-            </a:extLst>
-          </p:cNvPr>
-          <p:cNvPicPr>
-            <a:picLocks noChangeAspect="1"/>
-          </p:cNvPicPr>
-          <p:nvPr/>
-        </p:nvPicPr>
-        <p:blipFill>
-          <a:blip r:embed="rId2"/>
-          <a:stretch>
-            <a:fillRect/>
-          </a:stretch>
-        </p:blipFill>
-        <p:spPr>
-          <a:xfrm>
-            <a:off x="894290" y="2096464"/>
-            <a:ext cx="3287745" cy="3287745"/>
-          </a:xfrm>
-          <a:prstGeom prst="rect">
-            <a:avLst/>
-          </a:prstGeom>
-        </p:spPr>
-      </p:pic>
-      <p:pic>
-        <p:nvPicPr>
-          <p:cNvPr id="1026" name="Picture 2" descr="interactive_icon svg">
-            <a:extLst>
-              <a:ext uri="{FF2B5EF4-FFF2-40B4-BE49-F238E27FC236}">
-                <a16:creationId xmlns:a16="http://schemas.microsoft.com/office/drawing/2014/main" id="{896FD6E8-F334-5377-8D62-7E367133B3FA}"/>
-              </a:ext>
-            </a:extLst>
-          </p:cNvPr>
-          <p:cNvPicPr>
-            <a:picLocks noChangeAspect="1" noChangeArrowheads="1"/>
-          </p:cNvPicPr>
-          <p:nvPr/>
-        </p:nvPicPr>
-        <p:blipFill>
-          <a:blip r:embed="rId3">
-            <a:extLst>
-              <a:ext uri="{28A0092B-C50C-407E-A947-70E740481C1C}">
-                <a14:useLocalDpi xmlns:a14="http://schemas.microsoft.com/office/drawing/2010/main" val="0"/>
-              </a:ext>
-            </a:extLst>
-          </a:blip>
-          <a:srcRect/>
-          <a:stretch>
-            <a:fillRect/>
-          </a:stretch>
-        </p:blipFill>
-        <p:spPr bwMode="auto">
-          <a:xfrm>
-            <a:off x="2940422" y="5013191"/>
-            <a:ext cx="385483" cy="579835"/>
-          </a:xfrm>
-          <a:prstGeom prst="rect">
-            <a:avLst/>
-          </a:prstGeom>
-          <a:noFill/>
-          <a:extLst>
-            <a:ext uri="{909E8E84-426E-40DD-AFC4-6F175D3DCCD1}">
-              <a14:hiddenFill xmlns:a14="http://schemas.microsoft.com/office/drawing/2010/main">
-                <a:solidFill>
-                  <a:srgbClr val="FFFFFF"/>
-                </a:solidFill>
-              </a14:hiddenFill>
-            </a:ext>
-          </a:extLst>
-        </p:spPr>
-      </p:pic>
-    </p:spTree>
-    <p:extLst>
-      <p:ext uri="{BB962C8B-B14F-4D97-AF65-F5344CB8AC3E}">
-        <p14:creationId xmlns:p14="http://schemas.microsoft.com/office/powerpoint/2010/main" val="3303323989"/>
-      </p:ext>
-    </p:extLst>
-  </p:cSld>
-  <p:clrMapOvr>
-    <a:masterClrMapping/>
-  </p:clrMapOvr>
-</p:sld>
-</file>
-
-<file path=ppt/slides/slide11.xml><?xml version="1.0" encoding="utf-8"?>
-<p:sld xmlns:a="http://schemas.openxmlformats.org/drawingml/2006/main" xmlns:r="http://schemas.openxmlformats.org/officeDocument/2006/relationships" xmlns:p="http://schemas.openxmlformats.org/presentationml/2006/main">
-  <p:cSld>
-    <p:spTree>
-      <p:nvGrpSpPr>
-        <p:cNvPr id="1" name=""/>
-        <p:cNvGrpSpPr/>
-        <p:nvPr/>
-      </p:nvGrpSpPr>
-      <p:grpSpPr>
-        <a:xfrm>
-          <a:off x="0" y="0"/>
-          <a:ext cx="0" cy="0"/>
-          <a:chOff x="0" y="0"/>
-          <a:chExt cx="0" cy="0"/>
-        </a:xfrm>
-      </p:grpSpPr>
       <p:pic>
         <p:nvPicPr>
           <p:cNvPr id="2050" name="Picture 2">
@@ -12276,6 +9311,299 @@
         </p:nvSpPr>
         <p:spPr>
           <a:xfrm>
+            <a:off x="1066800" y="1102050"/>
+            <a:ext cx="10058400" cy="464372"/>
+          </a:xfrm>
+        </p:spPr>
+        <p:txBody>
+          <a:bodyPr>
+            <a:normAutofit fontScale="90000"/>
+          </a:bodyPr>
+          <a:lstStyle/>
+          <a:p>
+            <a:r>
+              <a:rPr lang="es-EC" b="1" dirty="0"/>
+              <a:t>Sobre su capacitador</a:t>
+            </a:r>
+            <a:endParaRPr lang="en-US" b="1" dirty="0"/>
+          </a:p>
+        </p:txBody>
+      </p:sp>
+      <p:sp>
+        <p:nvSpPr>
+          <p:cNvPr id="3" name="Marcador de contenido 2">
+            <a:extLst>
+              <a:ext uri="{FF2B5EF4-FFF2-40B4-BE49-F238E27FC236}">
+                <a16:creationId xmlns:a16="http://schemas.microsoft.com/office/drawing/2014/main" id="{CA6157D1-D74E-20C1-60BC-B2CC4E02429C}"/>
+              </a:ext>
+            </a:extLst>
+          </p:cNvPr>
+          <p:cNvSpPr>
+            <a:spLocks noGrp="1"/>
+          </p:cNvSpPr>
+          <p:nvPr>
+            <p:ph idx="1"/>
+          </p:nvPr>
+        </p:nvSpPr>
+        <p:spPr>
+          <a:xfrm>
+            <a:off x="1217963" y="1933284"/>
+            <a:ext cx="10310647" cy="4083269"/>
+          </a:xfrm>
+        </p:spPr>
+        <p:txBody>
+          <a:bodyPr>
+            <a:normAutofit fontScale="92500" lnSpcReduction="10000"/>
+          </a:bodyPr>
+          <a:lstStyle/>
+          <a:p>
+            <a:r>
+              <a:rPr lang="es-EC" b="1" dirty="0"/>
+              <a:t>Verónica Chimbo</a:t>
+            </a:r>
+          </a:p>
+          <a:p>
+            <a:pPr>
+              <a:buFont typeface="Wingdings" panose="05000000000000000000" pitchFamily="2" charset="2"/>
+              <a:buChar char="§"/>
+            </a:pPr>
+            <a:r>
+              <a:rPr lang="es-EC" dirty="0"/>
+              <a:t>Graduada en Ingeniería en Sistemas en la Universidad Nacional de Loja (2015)</a:t>
+            </a:r>
+          </a:p>
+          <a:p>
+            <a:pPr>
+              <a:buFont typeface="Wingdings" panose="05000000000000000000" pitchFamily="2" charset="2"/>
+              <a:buChar char="§"/>
+            </a:pPr>
+            <a:r>
+              <a:rPr lang="es-EC" dirty="0"/>
+              <a:t>Maestría en Inteligencia Artificial, Universidad Internacional de la Rioja, España (2019)</a:t>
+            </a:r>
+          </a:p>
+          <a:p>
+            <a:pPr>
+              <a:buFont typeface="Wingdings" panose="05000000000000000000" pitchFamily="2" charset="2"/>
+              <a:buChar char="§"/>
+            </a:pPr>
+            <a:r>
+              <a:rPr lang="es-EC" dirty="0"/>
+              <a:t>Cursa la maestría en Desarrollo de Aplicaciones Móviles, Universidad Oberta de Catalunya, España.</a:t>
+            </a:r>
+          </a:p>
+          <a:p>
+            <a:pPr>
+              <a:buFont typeface="Wingdings" panose="05000000000000000000" pitchFamily="2" charset="2"/>
+              <a:buChar char="§"/>
+            </a:pPr>
+            <a:r>
+              <a:rPr lang="es-EC" dirty="0"/>
+              <a:t>Actualmente docente a medio tiempo y CEO de la empresa de desarrollo de software </a:t>
+            </a:r>
+            <a:r>
+              <a:rPr lang="es-EC" dirty="0" err="1"/>
+              <a:t>Dvsystem</a:t>
+            </a:r>
+            <a:r>
+              <a:rPr lang="es-EC" dirty="0"/>
+              <a:t>.</a:t>
+            </a:r>
+          </a:p>
+          <a:p>
+            <a:pPr algn="just">
+              <a:buFont typeface="Wingdings" panose="05000000000000000000" pitchFamily="2" charset="2"/>
+              <a:buChar char="§"/>
+            </a:pPr>
+            <a:r>
+              <a:rPr lang="es-ES" dirty="0"/>
+              <a:t>Anteriormente trabajó como docente en el Instituto Superior Limón. Morona Santiago y Scrum Master del departamento de Desarrollo de Software en la empresa KRADAC de Loja. </a:t>
+            </a:r>
+          </a:p>
+          <a:p>
+            <a:r>
+              <a:rPr lang="es-EC" dirty="0"/>
+              <a:t>En redes sociales.</a:t>
+            </a:r>
+          </a:p>
+          <a:p>
+            <a:r>
+              <a:rPr lang="es-EC" dirty="0">
+                <a:hlinkClick r:id="rId2"/>
+              </a:rPr>
+              <a:t>https://www.linkedin.com/in/veronica-coronel-594075b8/</a:t>
+            </a:r>
+            <a:endParaRPr lang="es-EC" dirty="0"/>
+          </a:p>
+          <a:p>
+            <a:r>
+              <a:rPr lang="es-EC" dirty="0">
+                <a:hlinkClick r:id="rId3"/>
+              </a:rPr>
+              <a:t>https://github.com/vpchimboc/</a:t>
+            </a:r>
+            <a:endParaRPr lang="es-EC" dirty="0"/>
+          </a:p>
+          <a:p>
+            <a:endParaRPr lang="es-EC" dirty="0"/>
+          </a:p>
+          <a:p>
+            <a:endParaRPr lang="es-EC" dirty="0"/>
+          </a:p>
+          <a:p>
+            <a:endParaRPr lang="es-EC" dirty="0"/>
+          </a:p>
+          <a:p>
+            <a:endParaRPr lang="es-EC" dirty="0"/>
+          </a:p>
+          <a:p>
+            <a:endParaRPr lang="en-US" dirty="0"/>
+          </a:p>
+        </p:txBody>
+      </p:sp>
+    </p:spTree>
+    <p:extLst>
+      <p:ext uri="{BB962C8B-B14F-4D97-AF65-F5344CB8AC3E}">
+        <p14:creationId xmlns:p14="http://schemas.microsoft.com/office/powerpoint/2010/main" val="321139162"/>
+      </p:ext>
+    </p:extLst>
+  </p:cSld>
+  <p:clrMapOvr>
+    <a:masterClrMapping/>
+  </p:clrMapOvr>
+</p:sld>
+</file>
+
+<file path=ppt/slides/slide3.xml><?xml version="1.0" encoding="utf-8"?>
+<p:sld xmlns:a="http://schemas.openxmlformats.org/drawingml/2006/main" xmlns:r="http://schemas.openxmlformats.org/officeDocument/2006/relationships" xmlns:p="http://schemas.openxmlformats.org/presentationml/2006/main">
+  <p:cSld>
+    <p:spTree>
+      <p:nvGrpSpPr>
+        <p:cNvPr id="1" name=""/>
+        <p:cNvGrpSpPr/>
+        <p:nvPr/>
+      </p:nvGrpSpPr>
+      <p:grpSpPr>
+        <a:xfrm>
+          <a:off x="0" y="0"/>
+          <a:ext cx="0" cy="0"/>
+          <a:chOff x="0" y="0"/>
+          <a:chExt cx="0" cy="0"/>
+        </a:xfrm>
+      </p:grpSpPr>
+      <p:sp>
+        <p:nvSpPr>
+          <p:cNvPr id="2" name="Título 1">
+            <a:extLst>
+              <a:ext uri="{FF2B5EF4-FFF2-40B4-BE49-F238E27FC236}">
+                <a16:creationId xmlns:a16="http://schemas.microsoft.com/office/drawing/2014/main" id="{A9E37A1F-77EC-B536-EFE5-81DF26AA370D}"/>
+              </a:ext>
+            </a:extLst>
+          </p:cNvPr>
+          <p:cNvSpPr>
+            <a:spLocks noGrp="1"/>
+          </p:cNvSpPr>
+          <p:nvPr>
+            <p:ph type="title"/>
+          </p:nvPr>
+        </p:nvSpPr>
+        <p:spPr/>
+        <p:txBody>
+          <a:bodyPr/>
+          <a:lstStyle/>
+          <a:p>
+            <a:r>
+              <a:rPr lang="es-EC" b="1" dirty="0"/>
+              <a:t>Introducciones</a:t>
+            </a:r>
+            <a:endParaRPr lang="en-US" b="1" dirty="0"/>
+          </a:p>
+        </p:txBody>
+      </p:sp>
+      <p:sp>
+        <p:nvSpPr>
+          <p:cNvPr id="3" name="Marcador de contenido 2">
+            <a:extLst>
+              <a:ext uri="{FF2B5EF4-FFF2-40B4-BE49-F238E27FC236}">
+                <a16:creationId xmlns:a16="http://schemas.microsoft.com/office/drawing/2014/main" id="{95A13782-7CF2-B282-9B46-4055E56D489F}"/>
+              </a:ext>
+            </a:extLst>
+          </p:cNvPr>
+          <p:cNvSpPr>
+            <a:spLocks noGrp="1"/>
+          </p:cNvSpPr>
+          <p:nvPr>
+            <p:ph idx="1"/>
+          </p:nvPr>
+        </p:nvSpPr>
+        <p:spPr>
+          <a:xfrm>
+            <a:off x="1097280" y="2850405"/>
+            <a:ext cx="10058400" cy="748453"/>
+          </a:xfrm>
+        </p:spPr>
+        <p:txBody>
+          <a:bodyPr>
+            <a:normAutofit/>
+          </a:bodyPr>
+          <a:lstStyle/>
+          <a:p>
+            <a:r>
+              <a:rPr lang="es-EC" sz="2800" b="1" dirty="0"/>
+              <a:t>Conociendo a los participantes</a:t>
+            </a:r>
+            <a:endParaRPr lang="en-US" sz="2800" b="1" dirty="0"/>
+          </a:p>
+        </p:txBody>
+      </p:sp>
+    </p:spTree>
+    <p:extLst>
+      <p:ext uri="{BB962C8B-B14F-4D97-AF65-F5344CB8AC3E}">
+        <p14:creationId xmlns:p14="http://schemas.microsoft.com/office/powerpoint/2010/main" val="2612420168"/>
+      </p:ext>
+    </p:extLst>
+  </p:cSld>
+  <p:clrMapOvr>
+    <a:masterClrMapping/>
+  </p:clrMapOvr>
+</p:sld>
+</file>
+
+<file path=ppt/slides/slide4.xml><?xml version="1.0" encoding="utf-8"?>
+<p:sld xmlns:a="http://schemas.openxmlformats.org/drawingml/2006/main" xmlns:r="http://schemas.openxmlformats.org/officeDocument/2006/relationships" xmlns:p="http://schemas.openxmlformats.org/presentationml/2006/main">
+  <p:cSld>
+    <p:spTree>
+      <p:nvGrpSpPr>
+        <p:cNvPr id="1" name=""/>
+        <p:cNvGrpSpPr/>
+        <p:nvPr/>
+      </p:nvGrpSpPr>
+      <p:grpSpPr>
+        <a:xfrm>
+          <a:off x="0" y="0"/>
+          <a:ext cx="0" cy="0"/>
+          <a:chOff x="0" y="0"/>
+          <a:chExt cx="0" cy="0"/>
+        </a:xfrm>
+      </p:grpSpPr>
+      <p:sp>
+        <p:nvSpPr>
+          <p:cNvPr id="2" name="Título 1">
+            <a:extLst>
+              <a:ext uri="{FF2B5EF4-FFF2-40B4-BE49-F238E27FC236}">
+                <a16:creationId xmlns:a16="http://schemas.microsoft.com/office/drawing/2014/main" id="{AAE7EEDC-C99B-03CE-6DF5-872FABA89A6D}"/>
+              </a:ext>
+            </a:extLst>
+          </p:cNvPr>
+          <p:cNvSpPr>
+            <a:spLocks noGrp="1"/>
+          </p:cNvSpPr>
+          <p:nvPr>
+            <p:ph type="title"/>
+          </p:nvPr>
+        </p:nvSpPr>
+        <p:spPr>
+          <a:xfrm>
             <a:off x="1066800" y="1185451"/>
             <a:ext cx="10058400" cy="464372"/>
           </a:xfrm>
@@ -12338,7 +9666,7 @@
 </p:sld>
 </file>
 
-<file path=ppt/slides/slide3.xml><?xml version="1.0" encoding="utf-8"?>
+<file path=ppt/slides/slide5.xml><?xml version="1.0" encoding="utf-8"?>
 <p:sld xmlns:a="http://schemas.openxmlformats.org/drawingml/2006/main" xmlns:r="http://schemas.openxmlformats.org/officeDocument/2006/relationships" xmlns:p="http://schemas.openxmlformats.org/presentationml/2006/main">
   <p:cSld>
     <p:spTree>
@@ -12426,310 +9754,6 @@
     <p:extLst>
       <p:ext uri="{BB962C8B-B14F-4D97-AF65-F5344CB8AC3E}">
         <p14:creationId xmlns:p14="http://schemas.microsoft.com/office/powerpoint/2010/main" val="3456754644"/>
-      </p:ext>
-    </p:extLst>
-  </p:cSld>
-  <p:clrMapOvr>
-    <a:masterClrMapping/>
-  </p:clrMapOvr>
-</p:sld>
-</file>
-
-<file path=ppt/slides/slide4.xml><?xml version="1.0" encoding="utf-8"?>
-<p:sld xmlns:a="http://schemas.openxmlformats.org/drawingml/2006/main" xmlns:r="http://schemas.openxmlformats.org/officeDocument/2006/relationships" xmlns:p="http://schemas.openxmlformats.org/presentationml/2006/main">
-  <p:cSld>
-    <p:spTree>
-      <p:nvGrpSpPr>
-        <p:cNvPr id="1" name=""/>
-        <p:cNvGrpSpPr/>
-        <p:nvPr/>
-      </p:nvGrpSpPr>
-      <p:grpSpPr>
-        <a:xfrm>
-          <a:off x="0" y="0"/>
-          <a:ext cx="0" cy="0"/>
-          <a:chOff x="0" y="0"/>
-          <a:chExt cx="0" cy="0"/>
-        </a:xfrm>
-      </p:grpSpPr>
-      <p:sp>
-        <p:nvSpPr>
-          <p:cNvPr id="2" name="Título 1">
-            <a:extLst>
-              <a:ext uri="{FF2B5EF4-FFF2-40B4-BE49-F238E27FC236}">
-                <a16:creationId xmlns:a16="http://schemas.microsoft.com/office/drawing/2014/main" id="{AAE7EEDC-C99B-03CE-6DF5-872FABA89A6D}"/>
-              </a:ext>
-            </a:extLst>
-          </p:cNvPr>
-          <p:cNvSpPr>
-            <a:spLocks noGrp="1"/>
-          </p:cNvSpPr>
-          <p:nvPr>
-            <p:ph type="title"/>
-          </p:nvPr>
-        </p:nvSpPr>
-        <p:spPr>
-          <a:xfrm>
-            <a:off x="1066800" y="1102050"/>
-            <a:ext cx="10058400" cy="464372"/>
-          </a:xfrm>
-        </p:spPr>
-        <p:txBody>
-          <a:bodyPr>
-            <a:normAutofit fontScale="90000"/>
-          </a:bodyPr>
-          <a:lstStyle/>
-          <a:p>
-            <a:r>
-              <a:rPr lang="es-EC" b="1" dirty="0"/>
-              <a:t>Sobre su capacitador</a:t>
-            </a:r>
-            <a:endParaRPr lang="en-US" b="1" dirty="0"/>
-          </a:p>
-        </p:txBody>
-      </p:sp>
-      <p:sp>
-        <p:nvSpPr>
-          <p:cNvPr id="3" name="Marcador de contenido 2">
-            <a:extLst>
-              <a:ext uri="{FF2B5EF4-FFF2-40B4-BE49-F238E27FC236}">
-                <a16:creationId xmlns:a16="http://schemas.microsoft.com/office/drawing/2014/main" id="{CA6157D1-D74E-20C1-60BC-B2CC4E02429C}"/>
-              </a:ext>
-            </a:extLst>
-          </p:cNvPr>
-          <p:cNvSpPr>
-            <a:spLocks noGrp="1"/>
-          </p:cNvSpPr>
-          <p:nvPr>
-            <p:ph idx="1"/>
-          </p:nvPr>
-        </p:nvSpPr>
-        <p:spPr>
-          <a:xfrm>
-            <a:off x="1217963" y="1933284"/>
-            <a:ext cx="10310647" cy="4083269"/>
-          </a:xfrm>
-        </p:spPr>
-        <p:txBody>
-          <a:bodyPr>
-            <a:normAutofit fontScale="85000" lnSpcReduction="20000"/>
-          </a:bodyPr>
-          <a:lstStyle/>
-          <a:p>
-            <a:r>
-              <a:rPr lang="es-EC" b="1" dirty="0"/>
-              <a:t>Verónica Chimbo</a:t>
-            </a:r>
-          </a:p>
-          <a:p>
-            <a:pPr>
-              <a:buFont typeface="Wingdings" panose="05000000000000000000" pitchFamily="2" charset="2"/>
-              <a:buChar char="§"/>
-            </a:pPr>
-            <a:r>
-              <a:rPr lang="es-EC" dirty="0"/>
-              <a:t>Graduada en Ingeniería en Sistemas en la Universidad Nacional de Loja (2015)</a:t>
-            </a:r>
-          </a:p>
-          <a:p>
-            <a:pPr>
-              <a:buFont typeface="Wingdings" panose="05000000000000000000" pitchFamily="2" charset="2"/>
-              <a:buChar char="§"/>
-            </a:pPr>
-            <a:r>
-              <a:rPr lang="es-EC" dirty="0"/>
-              <a:t>Maestría en Inteligencia Artificial, Universidad Internacional de la Rioja, España (2019)</a:t>
-            </a:r>
-          </a:p>
-          <a:p>
-            <a:pPr>
-              <a:buFont typeface="Wingdings" panose="05000000000000000000" pitchFamily="2" charset="2"/>
-              <a:buChar char="§"/>
-            </a:pPr>
-            <a:r>
-              <a:rPr lang="es-EC" dirty="0"/>
-              <a:t>Cursa la maestría en Desarrollo de Aplicaciones Móviles, Universidad Oberta de Catalunya, España.</a:t>
-            </a:r>
-          </a:p>
-          <a:p>
-            <a:pPr>
-              <a:buFont typeface="Wingdings" panose="05000000000000000000" pitchFamily="2" charset="2"/>
-              <a:buChar char="§"/>
-            </a:pPr>
-            <a:r>
-              <a:rPr lang="es-EC" dirty="0"/>
-              <a:t>Actualmente docente a medio tiempo y CEO de la empresa de desarrollo de software </a:t>
-            </a:r>
-            <a:r>
-              <a:rPr lang="es-EC" dirty="0" err="1"/>
-              <a:t>Dvsystem</a:t>
-            </a:r>
-            <a:r>
-              <a:rPr lang="es-EC" dirty="0"/>
-              <a:t>.</a:t>
-            </a:r>
-          </a:p>
-          <a:p>
-            <a:pPr algn="just">
-              <a:buFont typeface="Wingdings" panose="05000000000000000000" pitchFamily="2" charset="2"/>
-              <a:buChar char="§"/>
-            </a:pPr>
-            <a:r>
-              <a:rPr lang="es-ES" dirty="0"/>
-              <a:t>Actualmente investiga las áreas de: Visión por computadora, inteligencia artificial para el mejoramiento en la detección y clasificación de objetos en tiempo real, redes neuronales artificiales y agentes inteligentes.</a:t>
-            </a:r>
-          </a:p>
-          <a:p>
-            <a:pPr>
-              <a:buFont typeface="Wingdings" panose="05000000000000000000" pitchFamily="2" charset="2"/>
-              <a:buChar char="§"/>
-            </a:pPr>
-            <a:r>
-              <a:rPr lang="es-ES" dirty="0"/>
-              <a:t>Anteriormente trabajó como docente en el Instituto Superior Limón. Morona Santiago y como desarrolladora de Software en la empresa KRADAC de Loja. </a:t>
-            </a:r>
-            <a:endParaRPr lang="es-EC" dirty="0"/>
-          </a:p>
-          <a:p>
-            <a:r>
-              <a:rPr lang="es-EC" dirty="0"/>
-              <a:t>En redes sociales.</a:t>
-            </a:r>
-          </a:p>
-          <a:p>
-            <a:r>
-              <a:rPr lang="es-EC" dirty="0">
-                <a:hlinkClick r:id="rId2"/>
-              </a:rPr>
-              <a:t>https://www.linkedin.com/in/veronica-coronel-594075b8/</a:t>
-            </a:r>
-            <a:endParaRPr lang="es-EC" dirty="0"/>
-          </a:p>
-          <a:p>
-            <a:r>
-              <a:rPr lang="es-EC" dirty="0">
-                <a:hlinkClick r:id="rId3"/>
-              </a:rPr>
-              <a:t>https://github.com/vpchimboc/</a:t>
-            </a:r>
-            <a:endParaRPr lang="es-EC" dirty="0"/>
-          </a:p>
-          <a:p>
-            <a:endParaRPr lang="es-EC" dirty="0"/>
-          </a:p>
-          <a:p>
-            <a:endParaRPr lang="es-EC" dirty="0"/>
-          </a:p>
-          <a:p>
-            <a:endParaRPr lang="es-EC" dirty="0"/>
-          </a:p>
-          <a:p>
-            <a:endParaRPr lang="es-EC" dirty="0"/>
-          </a:p>
-          <a:p>
-            <a:endParaRPr lang="en-US" dirty="0"/>
-          </a:p>
-        </p:txBody>
-      </p:sp>
-    </p:spTree>
-    <p:extLst>
-      <p:ext uri="{BB962C8B-B14F-4D97-AF65-F5344CB8AC3E}">
-        <p14:creationId xmlns:p14="http://schemas.microsoft.com/office/powerpoint/2010/main" val="321139162"/>
-      </p:ext>
-    </p:extLst>
-  </p:cSld>
-  <p:clrMapOvr>
-    <a:masterClrMapping/>
-  </p:clrMapOvr>
-</p:sld>
-</file>
-
-<file path=ppt/slides/slide5.xml><?xml version="1.0" encoding="utf-8"?>
-<p:sld xmlns:a="http://schemas.openxmlformats.org/drawingml/2006/main" xmlns:r="http://schemas.openxmlformats.org/officeDocument/2006/relationships" xmlns:p="http://schemas.openxmlformats.org/presentationml/2006/main">
-  <p:cSld>
-    <p:spTree>
-      <p:nvGrpSpPr>
-        <p:cNvPr id="1" name=""/>
-        <p:cNvGrpSpPr/>
-        <p:nvPr/>
-      </p:nvGrpSpPr>
-      <p:grpSpPr>
-        <a:xfrm>
-          <a:off x="0" y="0"/>
-          <a:ext cx="0" cy="0"/>
-          <a:chOff x="0" y="0"/>
-          <a:chExt cx="0" cy="0"/>
-        </a:xfrm>
-      </p:grpSpPr>
-      <p:sp>
-        <p:nvSpPr>
-          <p:cNvPr id="2" name="Título 1">
-            <a:extLst>
-              <a:ext uri="{FF2B5EF4-FFF2-40B4-BE49-F238E27FC236}">
-                <a16:creationId xmlns:a16="http://schemas.microsoft.com/office/drawing/2014/main" id="{A9E37A1F-77EC-B536-EFE5-81DF26AA370D}"/>
-              </a:ext>
-            </a:extLst>
-          </p:cNvPr>
-          <p:cNvSpPr>
-            <a:spLocks noGrp="1"/>
-          </p:cNvSpPr>
-          <p:nvPr>
-            <p:ph type="title"/>
-          </p:nvPr>
-        </p:nvSpPr>
-        <p:spPr/>
-        <p:txBody>
-          <a:bodyPr/>
-          <a:lstStyle/>
-          <a:p>
-            <a:r>
-              <a:rPr lang="es-EC" b="1" dirty="0"/>
-              <a:t>Introducciones</a:t>
-            </a:r>
-            <a:endParaRPr lang="en-US" b="1" dirty="0"/>
-          </a:p>
-        </p:txBody>
-      </p:sp>
-      <p:sp>
-        <p:nvSpPr>
-          <p:cNvPr id="3" name="Marcador de contenido 2">
-            <a:extLst>
-              <a:ext uri="{FF2B5EF4-FFF2-40B4-BE49-F238E27FC236}">
-                <a16:creationId xmlns:a16="http://schemas.microsoft.com/office/drawing/2014/main" id="{95A13782-7CF2-B282-9B46-4055E56D489F}"/>
-              </a:ext>
-            </a:extLst>
-          </p:cNvPr>
-          <p:cNvSpPr>
-            <a:spLocks noGrp="1"/>
-          </p:cNvSpPr>
-          <p:nvPr>
-            <p:ph idx="1"/>
-          </p:nvPr>
-        </p:nvSpPr>
-        <p:spPr>
-          <a:xfrm>
-            <a:off x="1097280" y="2850405"/>
-            <a:ext cx="10058400" cy="748453"/>
-          </a:xfrm>
-        </p:spPr>
-        <p:txBody>
-          <a:bodyPr>
-            <a:normAutofit/>
-          </a:bodyPr>
-          <a:lstStyle/>
-          <a:p>
-            <a:r>
-              <a:rPr lang="es-EC" sz="2800" b="1" dirty="0"/>
-              <a:t>Conociendo a los participantes</a:t>
-            </a:r>
-            <a:endParaRPr lang="en-US" sz="2800" b="1" dirty="0"/>
-          </a:p>
-        </p:txBody>
-      </p:sp>
-    </p:spTree>
-    <p:extLst>
-      <p:ext uri="{BB962C8B-B14F-4D97-AF65-F5344CB8AC3E}">
-        <p14:creationId xmlns:p14="http://schemas.microsoft.com/office/powerpoint/2010/main" val="2612420168"/>
       </p:ext>
     </p:extLst>
   </p:cSld>
@@ -12996,47 +10020,53 @@
           <a:p>
             <a:r>
               <a:rPr lang="es-EC" b="1" dirty="0"/>
-              <a:t>Temas a cubrir</a:t>
+              <a:t>Calificaciones</a:t>
             </a:r>
             <a:endParaRPr lang="en-US" b="1" dirty="0"/>
           </a:p>
         </p:txBody>
       </p:sp>
-      <p:graphicFrame>
-        <p:nvGraphicFramePr>
-          <p:cNvPr id="4" name="Marcador de contenido 3">
+      <p:sp>
+        <p:nvSpPr>
+          <p:cNvPr id="3" name="Marcador de contenido 2">
             <a:extLst>
               <a:ext uri="{FF2B5EF4-FFF2-40B4-BE49-F238E27FC236}">
-                <a16:creationId xmlns:a16="http://schemas.microsoft.com/office/drawing/2014/main" id="{5B36CAD0-CB28-B48D-F606-F19A04078CEF}"/>
+                <a16:creationId xmlns:a16="http://schemas.microsoft.com/office/drawing/2014/main" id="{95A13782-7CF2-B282-9B46-4055E56D489F}"/>
               </a:ext>
             </a:extLst>
           </p:cNvPr>
-          <p:cNvGraphicFramePr>
-            <a:graphicFrameLocks noGrp="1"/>
-          </p:cNvGraphicFramePr>
+          <p:cNvSpPr>
+            <a:spLocks noGrp="1"/>
+          </p:cNvSpPr>
           <p:nvPr>
             <p:ph idx="1"/>
-            <p:extLst>
-              <p:ext uri="{D42A27DB-BD31-4B8C-83A1-F6EECF244321}">
-                <p14:modId xmlns:p14="http://schemas.microsoft.com/office/powerpoint/2010/main" val="2385859902"/>
-              </p:ext>
-            </p:extLst>
           </p:nvPr>
-        </p:nvGraphicFramePr>
-        <p:xfrm>
-          <a:off x="1096963" y="1846263"/>
-          <a:ext cx="10058400" cy="4022725"/>
-        </p:xfrm>
-        <a:graphic>
-          <a:graphicData uri="http://schemas.openxmlformats.org/drawingml/2006/diagram">
-            <dgm:relIds xmlns:dgm="http://schemas.openxmlformats.org/drawingml/2006/diagram" xmlns:r="http://schemas.openxmlformats.org/officeDocument/2006/relationships" r:dm="rId2" r:lo="rId3" r:qs="rId4" r:cs="rId5"/>
-          </a:graphicData>
-        </a:graphic>
-      </p:graphicFrame>
+        </p:nvSpPr>
+        <p:spPr>
+          <a:xfrm>
+            <a:off x="876563" y="3067970"/>
+            <a:ext cx="10058400" cy="2052671"/>
+          </a:xfrm>
+        </p:spPr>
+        <p:txBody>
+          <a:bodyPr>
+            <a:normAutofit/>
+          </a:bodyPr>
+          <a:lstStyle/>
+          <a:p>
+            <a:pPr algn="ctr"/>
+            <a:r>
+              <a:rPr lang="es-ES" sz="2800" dirty="0"/>
+              <a:t>El curso tiene una duración de 80 horas académicas, se aprueba con el 70% como mínimo de la nota total y un 70% de asistencias.</a:t>
+            </a:r>
+            <a:endParaRPr lang="en-US" sz="2800" dirty="0"/>
+          </a:p>
+        </p:txBody>
+      </p:sp>
     </p:spTree>
     <p:extLst>
       <p:ext uri="{BB962C8B-B14F-4D97-AF65-F5344CB8AC3E}">
-        <p14:creationId xmlns:p14="http://schemas.microsoft.com/office/powerpoint/2010/main" val="1112197426"/>
+        <p14:creationId xmlns:p14="http://schemas.microsoft.com/office/powerpoint/2010/main" val="561751461"/>
       </p:ext>
     </p:extLst>
   </p:cSld>
@@ -13086,7 +10116,7 @@
           <a:p>
             <a:r>
               <a:rPr lang="es-EC" b="1" dirty="0"/>
-              <a:t>Calificaciones</a:t>
+              <a:t>Recursos</a:t>
             </a:r>
             <a:endParaRPr lang="en-US" b="1" dirty="0"/>
           </a:p>
@@ -13110,7 +10140,7 @@
         </p:nvSpPr>
         <p:spPr>
           <a:xfrm>
-            <a:off x="876563" y="3067970"/>
+            <a:off x="876563" y="2702209"/>
             <a:ext cx="10058400" cy="2052671"/>
           </a:xfrm>
         </p:spPr>
@@ -13123,7 +10153,21 @@
             <a:pPr algn="ctr"/>
             <a:r>
               <a:rPr lang="es-ES" sz="2800" dirty="0"/>
-              <a:t>El curso tiene una duración de 80 horas académicas, se aprueba con el 70% como mínimo de la nota total y un 70% de asistencias.</a:t>
+              <a:t>Todo el material estará disponible en la plataforma institucional.</a:t>
+            </a:r>
+          </a:p>
+          <a:p>
+            <a:pPr algn="ctr"/>
+            <a:r>
+              <a:rPr lang="es-ES" sz="2800" b="1" dirty="0"/>
+              <a:t>Curso Python Básico</a:t>
+            </a:r>
+          </a:p>
+          <a:p>
+            <a:pPr algn="ctr"/>
+            <a:r>
+              <a:rPr lang="es-ES" sz="2800" dirty="0"/>
+              <a:t>Se actualizará periódicamente al terminar las clases y es donde se llevará a cabo el control de las actividades autónomas.</a:t>
             </a:r>
             <a:endParaRPr lang="en-US" sz="2800" dirty="0"/>
           </a:p>
@@ -13132,7 +10176,7 @@
     </p:spTree>
     <p:extLst>
       <p:ext uri="{BB962C8B-B14F-4D97-AF65-F5344CB8AC3E}">
-        <p14:creationId xmlns:p14="http://schemas.microsoft.com/office/powerpoint/2010/main" val="561751461"/>
+        <p14:creationId xmlns:p14="http://schemas.microsoft.com/office/powerpoint/2010/main" val="2265883724"/>
       </p:ext>
     </p:extLst>
   </p:cSld>
@@ -13182,7 +10226,7 @@
           <a:p>
             <a:r>
               <a:rPr lang="es-EC" b="1" dirty="0"/>
-              <a:t>Recursos</a:t>
+              <a:t>Encuesta de conocimientos</a:t>
             </a:r>
             <a:endParaRPr lang="en-US" b="1" dirty="0"/>
           </a:p>
@@ -13206,43 +10250,113 @@
         </p:nvSpPr>
         <p:spPr>
           <a:xfrm>
-            <a:off x="876563" y="2702209"/>
-            <a:ext cx="10058400" cy="2052671"/>
+            <a:off x="4742329" y="2537135"/>
+            <a:ext cx="6243948" cy="2052671"/>
           </a:xfrm>
         </p:spPr>
         <p:txBody>
           <a:bodyPr>
-            <a:normAutofit/>
+            <a:normAutofit fontScale="92500" lnSpcReduction="20000"/>
           </a:bodyPr>
           <a:lstStyle/>
           <a:p>
             <a:pPr algn="ctr"/>
             <a:r>
+              <a:rPr lang="es-ES" sz="2800" b="1" dirty="0"/>
+              <a:t>Una encuesta anónima que nos permitirá definir detalles más específicos de la malla del curso.</a:t>
+            </a:r>
+          </a:p>
+          <a:p>
+            <a:pPr algn="ctr"/>
+            <a:r>
               <a:rPr lang="es-ES" sz="2800" dirty="0"/>
-              <a:t>Todo el material estará disponible en la plataforma institucional.</a:t>
-            </a:r>
-          </a:p>
-          <a:p>
-            <a:pPr algn="ctr"/>
-            <a:r>
-              <a:rPr lang="es-ES" sz="2800" b="1" dirty="0"/>
-              <a:t>Curso Python Básico</a:t>
-            </a:r>
-          </a:p>
-          <a:p>
-            <a:pPr algn="ctr"/>
-            <a:r>
-              <a:rPr lang="es-ES" sz="2800" dirty="0"/>
-              <a:t>Se actualizará periódicamente al terminar las clases y es donde se llevará a cabo el control de las actividades autónomas.</a:t>
+              <a:t>Por favor, responder con honestidad ya que con eso nos aseguraremos de que aprendamos de mejor manera.</a:t>
             </a:r>
             <a:endParaRPr lang="en-US" sz="2800" dirty="0"/>
           </a:p>
         </p:txBody>
       </p:sp>
+      <p:pic>
+        <p:nvPicPr>
+          <p:cNvPr id="5" name="Imagen 4">
+            <a:extLst>
+              <a:ext uri="{FF2B5EF4-FFF2-40B4-BE49-F238E27FC236}">
+                <a16:creationId xmlns:a16="http://schemas.microsoft.com/office/drawing/2014/main" id="{EAA3F86C-B88A-8128-0667-14B02F12EA90}"/>
+              </a:ext>
+            </a:extLst>
+          </p:cNvPr>
+          <p:cNvPicPr>
+            <a:picLocks noChangeAspect="1"/>
+          </p:cNvPicPr>
+          <p:nvPr/>
+        </p:nvPicPr>
+        <p:blipFill>
+          <a:blip r:embed="rId2"/>
+          <a:stretch>
+            <a:fillRect/>
+          </a:stretch>
+        </p:blipFill>
+        <p:spPr>
+          <a:xfrm>
+            <a:off x="894290" y="2096464"/>
+            <a:ext cx="3287745" cy="3287745"/>
+          </a:xfrm>
+          <a:prstGeom prst="rect">
+            <a:avLst/>
+          </a:prstGeom>
+        </p:spPr>
+      </p:pic>
+      <p:pic>
+        <p:nvPicPr>
+          <p:cNvPr id="1026" name="Picture 2" descr="interactive_icon svg">
+            <a:extLst>
+              <a:ext uri="{FF2B5EF4-FFF2-40B4-BE49-F238E27FC236}">
+                <a16:creationId xmlns:a16="http://schemas.microsoft.com/office/drawing/2014/main" id="{896FD6E8-F334-5377-8D62-7E367133B3FA}"/>
+              </a:ext>
+            </a:extLst>
+          </p:cNvPr>
+          <p:cNvPicPr>
+            <a:picLocks noChangeAspect="1" noChangeArrowheads="1"/>
+          </p:cNvPicPr>
+          <p:nvPr/>
+        </p:nvPicPr>
+        <p:blipFill>
+          <a:blip r:embed="rId3">
+            <a:extLst>
+              <a:ext uri="{28A0092B-C50C-407E-A947-70E740481C1C}">
+                <a14:useLocalDpi xmlns:a14="http://schemas.microsoft.com/office/drawing/2010/main" val="0"/>
+              </a:ext>
+            </a:extLst>
+          </a:blip>
+          <a:srcRect/>
+          <a:stretch>
+            <a:fillRect/>
+          </a:stretch>
+        </p:blipFill>
+        <p:spPr bwMode="auto">
+          <a:xfrm>
+            <a:off x="2940422" y="5013191"/>
+            <a:ext cx="385483" cy="579835"/>
+          </a:xfrm>
+          <a:prstGeom prst="rect">
+            <a:avLst/>
+          </a:prstGeom>
+          <a:noFill/>
+          <a:extLst>
+            <a:ext uri="{909E8E84-426E-40DD-AFC4-6F175D3DCCD1}">
+              <a14:hiddenFill xmlns:a14="http://schemas.microsoft.com/office/drawing/2010/main">
+                <a:solidFill>
+                  <a:srgbClr val="FFFFFF"/>
+                </a:solidFill>
+              </a14:hiddenFill>
+            </a:ext>
+          </a:extLst>
+        </p:spPr>
+      </p:pic>
     </p:spTree>
     <p:extLst>
       <p:ext uri="{BB962C8B-B14F-4D97-AF65-F5344CB8AC3E}">
-        <p14:creationId xmlns:p14="http://schemas.microsoft.com/office/powerpoint/2010/main" val="2265883724"/>
+        <p14:creationId xmlns:p14="http://schemas.microsoft.com/office/powerpoint/2010/main" val="3303323989"/>
       </p:ext>
     </p:extLst>
   </p:cSld>

</xml_diff>